<commit_message>
Lecture 02 and tasks
</commit_message>
<xml_diff>
--- a/_Presentations/02 Working with strings and texts.pptx
+++ b/_Presentations/02 Working with strings and texts.pptx
@@ -5,7 +5,7 @@
     <p:sldMasterId id="2147483660" r:id="rId1"/>
   </p:sldMasterIdLst>
   <p:notesMasterIdLst>
-    <p:notesMasterId r:id="rId35"/>
+    <p:notesMasterId r:id="rId57"/>
   </p:notesMasterIdLst>
   <p:sldIdLst>
     <p:sldId id="256" r:id="rId2"/>
@@ -35,47 +35,69 @@
     <p:sldId id="297" r:id="rId26"/>
     <p:sldId id="298" r:id="rId27"/>
     <p:sldId id="299" r:id="rId28"/>
-    <p:sldId id="282" r:id="rId29"/>
-    <p:sldId id="283" r:id="rId30"/>
-    <p:sldId id="284" r:id="rId31"/>
-    <p:sldId id="285" r:id="rId32"/>
-    <p:sldId id="286" r:id="rId33"/>
-    <p:sldId id="268" r:id="rId34"/>
+    <p:sldId id="300" r:id="rId29"/>
+    <p:sldId id="301" r:id="rId30"/>
+    <p:sldId id="302" r:id="rId31"/>
+    <p:sldId id="303" r:id="rId32"/>
+    <p:sldId id="304" r:id="rId33"/>
+    <p:sldId id="305" r:id="rId34"/>
+    <p:sldId id="306" r:id="rId35"/>
+    <p:sldId id="308" r:id="rId36"/>
+    <p:sldId id="307" r:id="rId37"/>
+    <p:sldId id="309" r:id="rId38"/>
+    <p:sldId id="310" r:id="rId39"/>
+    <p:sldId id="311" r:id="rId40"/>
+    <p:sldId id="312" r:id="rId41"/>
+    <p:sldId id="314" r:id="rId42"/>
+    <p:sldId id="315" r:id="rId43"/>
+    <p:sldId id="313" r:id="rId44"/>
+    <p:sldId id="316" r:id="rId45"/>
+    <p:sldId id="317" r:id="rId46"/>
+    <p:sldId id="318" r:id="rId47"/>
+    <p:sldId id="319" r:id="rId48"/>
+    <p:sldId id="320" r:id="rId49"/>
+    <p:sldId id="321" r:id="rId50"/>
+    <p:sldId id="282" r:id="rId51"/>
+    <p:sldId id="283" r:id="rId52"/>
+    <p:sldId id="284" r:id="rId53"/>
+    <p:sldId id="285" r:id="rId54"/>
+    <p:sldId id="286" r:id="rId55"/>
+    <p:sldId id="268" r:id="rId56"/>
   </p:sldIdLst>
   <p:sldSz cx="12192000" cy="6858000"/>
   <p:notesSz cx="6858000" cy="9144000"/>
   <p:embeddedFontLst>
     <p:embeddedFont>
       <p:font typeface="Candara" panose="020E0502030303020204" pitchFamily="34" charset="0"/>
-      <p:regular r:id="rId36"/>
-      <p:bold r:id="rId37"/>
-      <p:italic r:id="rId38"/>
-      <p:boldItalic r:id="rId39"/>
+      <p:regular r:id="rId58"/>
+      <p:bold r:id="rId59"/>
+      <p:italic r:id="rId60"/>
+      <p:boldItalic r:id="rId61"/>
     </p:embeddedFont>
     <p:embeddedFont>
       <p:font typeface="Consolas" panose="020B0609020204030204" pitchFamily="49" charset="0"/>
-      <p:regular r:id="rId40"/>
-      <p:bold r:id="rId41"/>
-      <p:italic r:id="rId42"/>
-      <p:boldItalic r:id="rId43"/>
+      <p:regular r:id="rId62"/>
+      <p:bold r:id="rId63"/>
+      <p:italic r:id="rId64"/>
+      <p:boldItalic r:id="rId65"/>
     </p:embeddedFont>
     <p:embeddedFont>
       <p:font typeface="Lato" panose="020F0502020204030203" pitchFamily="34" charset="0"/>
-      <p:regular r:id="rId44"/>
-      <p:bold r:id="rId45"/>
-      <p:italic r:id="rId46"/>
-      <p:boldItalic r:id="rId47"/>
+      <p:regular r:id="rId66"/>
+      <p:bold r:id="rId67"/>
+      <p:italic r:id="rId68"/>
+      <p:boldItalic r:id="rId69"/>
     </p:embeddedFont>
     <p:embeddedFont>
       <p:font typeface="Montserrat" panose="00000500000000000000" pitchFamily="2" charset="-52"/>
-      <p:regular r:id="rId48"/>
-      <p:bold r:id="rId49"/>
-      <p:italic r:id="rId50"/>
-      <p:boldItalic r:id="rId51"/>
+      <p:regular r:id="rId70"/>
+      <p:bold r:id="rId71"/>
+      <p:italic r:id="rId72"/>
+      <p:boldItalic r:id="rId73"/>
     </p:embeddedFont>
     <p:embeddedFont>
       <p:font typeface="Questrial" panose="020B0604020202020204" charset="0"/>
-      <p:regular r:id="rId52"/>
+      <p:regular r:id="rId74"/>
     </p:embeddedFont>
   </p:embeddedFontLst>
   <p:defaultTextStyle>
@@ -13631,7 +13653,7 @@
           <p:cNvPr id="2" name="Title 1">
             <a:extLst>
               <a:ext uri="{FF2B5EF4-FFF2-40B4-BE49-F238E27FC236}">
-                <a16:creationId xmlns:a16="http://schemas.microsoft.com/office/drawing/2014/main" id="{FE6D1496-DBA1-4F1E-B31B-ECFD3A95AC9A}"/>
+                <a16:creationId xmlns:a16="http://schemas.microsoft.com/office/drawing/2014/main" id="{5D2D0EA2-6DC5-479F-8F60-12102D25BC67}"/>
               </a:ext>
             </a:extLst>
           </p:cNvPr>
@@ -13647,10 +13669,6 @@
           <a:bodyPr/>
           <a:lstStyle/>
           <a:p>
-            <a:r>
-              <a:rPr lang="en-US" dirty="0"/>
-              <a:t>Exercises</a:t>
-            </a:r>
             <a:endParaRPr lang="bg-BG" dirty="0"/>
           </a:p>
         </p:txBody>
@@ -13660,7 +13678,7 @@
           <p:cNvPr id="3" name="Text Placeholder 2">
             <a:extLst>
               <a:ext uri="{FF2B5EF4-FFF2-40B4-BE49-F238E27FC236}">
-                <a16:creationId xmlns:a16="http://schemas.microsoft.com/office/drawing/2014/main" id="{46794E69-9CFC-447C-B558-E78A8A25E04F}"/>
+                <a16:creationId xmlns:a16="http://schemas.microsoft.com/office/drawing/2014/main" id="{841DA628-F4E3-4575-B026-D8B32E4DA167}"/>
               </a:ext>
             </a:extLst>
           </p:cNvPr>
@@ -13671,111 +13689,19 @@
             <p:ph type="body" idx="1"/>
           </p:nvPr>
         </p:nvSpPr>
-        <p:spPr>
-          <a:xfrm>
-            <a:off x="1523999" y="1600199"/>
-            <a:ext cx="10512357" cy="4936787"/>
-          </a:xfrm>
-        </p:spPr>
+        <p:spPr/>
         <p:txBody>
           <a:bodyPr/>
           <a:lstStyle/>
           <a:p>
-            <a:pPr marL="558800" indent="-457200">
-              <a:buFont typeface="+mj-lt"/>
-              <a:buAutoNum type="arabicPeriod"/>
-            </a:pPr>
-            <a:r>
-              <a:rPr lang="en-US" sz="1800" dirty="0"/>
-              <a:t>Write a program that reads a string, reverse it and prints it to the console. For example: "introduction" =&gt; "</a:t>
-            </a:r>
-            <a:r>
-              <a:rPr lang="en-US" sz="1800" dirty="0" err="1"/>
-              <a:t>noitcudortni</a:t>
-            </a:r>
-            <a:r>
-              <a:rPr lang="en-US" sz="1800" dirty="0"/>
-              <a:t>".</a:t>
-            </a:r>
-          </a:p>
-          <a:p>
-            <a:pPr marL="558800" indent="-457200">
-              <a:buFont typeface="+mj-lt"/>
-              <a:buAutoNum type="arabicPeriod"/>
-            </a:pPr>
-            <a:r>
-              <a:rPr lang="en-US" sz="1800" dirty="0"/>
-              <a:t>Write a program that checks whether the parentheses are placed correctly in an arithmetic expression. </a:t>
-            </a:r>
-          </a:p>
-          <a:p>
-            <a:pPr lvl="1"/>
-            <a:r>
-              <a:rPr lang="en-US" sz="1600" dirty="0"/>
-              <a:t>Example of expression with correctly placed brackets: ((</a:t>
-            </a:r>
-            <a:r>
-              <a:rPr lang="en-US" sz="1600" dirty="0" err="1"/>
-              <a:t>a+b</a:t>
-            </a:r>
-            <a:r>
-              <a:rPr lang="en-US" sz="1600" dirty="0"/>
-              <a:t>)/5-d). </a:t>
-            </a:r>
-          </a:p>
-          <a:p>
-            <a:pPr lvl="1"/>
-            <a:r>
-              <a:rPr lang="en-US" sz="1600" dirty="0"/>
-              <a:t>Example of an incorrect expression: )(</a:t>
-            </a:r>
-            <a:r>
-              <a:rPr lang="en-US" sz="1600" dirty="0" err="1"/>
-              <a:t>a+b</a:t>
-            </a:r>
-            <a:r>
-              <a:rPr lang="en-US" sz="1600" dirty="0"/>
-              <a:t>))</a:t>
-            </a:r>
-          </a:p>
-          <a:p>
-            <a:pPr marL="558800" indent="-457200">
-              <a:buFont typeface="+mj-lt"/>
-              <a:buAutoNum type="arabicPeriod"/>
-            </a:pPr>
-            <a:r>
-              <a:rPr lang="en-US" sz="1800" dirty="0"/>
-              <a:t>Write a program that detects how many times a substring is contained in the text. </a:t>
-            </a:r>
-          </a:p>
-          <a:p>
-            <a:pPr marL="1016000" lvl="1" indent="-457200"/>
-            <a:r>
-              <a:rPr lang="en-US" sz="1600" dirty="0"/>
-              <a:t>For example, let’s look for the substring "in" in the text:</a:t>
-            </a:r>
-          </a:p>
-          <a:p>
-            <a:pPr marL="1016000" lvl="1" indent="-457200"/>
-            <a:r>
-              <a:rPr lang="en-US" sz="1600" i="1" dirty="0"/>
-              <a:t>We are living in a yellow submarine. We don't have anything else. Inside the submarine is very tight. So we are drinking all the day. We will move out of it in 5 days.</a:t>
-            </a:r>
-          </a:p>
-          <a:p>
-            <a:pPr lvl="3"/>
-            <a:r>
-              <a:rPr lang="en-US" sz="1200" dirty="0"/>
-              <a:t>The result is 9 occurrences.</a:t>
-            </a:r>
-            <a:endParaRPr lang="bg-BG" sz="1200" dirty="0"/>
+            <a:endParaRPr lang="bg-BG"/>
           </a:p>
         </p:txBody>
       </p:sp>
     </p:spTree>
     <p:extLst>
       <p:ext uri="{BB962C8B-B14F-4D97-AF65-F5344CB8AC3E}">
-        <p14:creationId xmlns:p14="http://schemas.microsoft.com/office/powerpoint/2010/main" val="3146407016"/>
+        <p14:creationId xmlns:p14="http://schemas.microsoft.com/office/powerpoint/2010/main" val="1484501958"/>
       </p:ext>
     </p:extLst>
   </p:cSld>
@@ -13807,7 +13733,7 @@
           <p:cNvPr id="2" name="Title 1">
             <a:extLst>
               <a:ext uri="{FF2B5EF4-FFF2-40B4-BE49-F238E27FC236}">
-                <a16:creationId xmlns:a16="http://schemas.microsoft.com/office/drawing/2014/main" id="{1A05734E-AECF-42D6-856A-DB255C8EACC9}"/>
+                <a16:creationId xmlns:a16="http://schemas.microsoft.com/office/drawing/2014/main" id="{6285A1D5-1898-41F0-ABF0-908AFC4B3EC1}"/>
               </a:ext>
             </a:extLst>
           </p:cNvPr>
@@ -13825,7 +13751,7 @@
           <a:p>
             <a:r>
               <a:rPr lang="en-US" dirty="0"/>
-              <a:t>Exercises</a:t>
+              <a:t>Replacing a Substring</a:t>
             </a:r>
             <a:endParaRPr lang="bg-BG" dirty="0"/>
           </a:p>
@@ -13836,7 +13762,7 @@
           <p:cNvPr id="3" name="Text Placeholder 2">
             <a:extLst>
               <a:ext uri="{FF2B5EF4-FFF2-40B4-BE49-F238E27FC236}">
-                <a16:creationId xmlns:a16="http://schemas.microsoft.com/office/drawing/2014/main" id="{EFCBA505-9A60-4594-BC4C-7B981DDE63B6}"/>
+                <a16:creationId xmlns:a16="http://schemas.microsoft.com/office/drawing/2014/main" id="{498156D0-3FF5-4C36-9E42-13C74214A5BD}"/>
               </a:ext>
             </a:extLst>
           </p:cNvPr>
@@ -13852,56 +13778,24 @@
           <a:bodyPr/>
           <a:lstStyle/>
           <a:p>
-            <a:pPr marL="101600" indent="0">
-              <a:buNone/>
-            </a:pPr>
-            <a:r>
-              <a:rPr lang="en-US" sz="1800" dirty="0"/>
-              <a:t>4. Write a program that extracts from a text all sentences that contain a particular word. We accept that the sentences are separated from each other by the character "." and the words are separated from one another by a character which is not a letter. </a:t>
-            </a:r>
-          </a:p>
-          <a:p>
-            <a:pPr lvl="1"/>
-            <a:r>
-              <a:rPr lang="en-US" sz="1600" dirty="0"/>
-              <a:t>Sample text: </a:t>
-            </a:r>
-          </a:p>
-          <a:p>
-            <a:pPr lvl="2"/>
-            <a:r>
-              <a:rPr lang="en-US" sz="1400" dirty="0"/>
-              <a:t>We are living in a yellow submarine. We don't have anything else. Inside the submarine is very tight. So we are drinking all the day. We will move out of it in 5 days.</a:t>
-            </a:r>
-          </a:p>
-          <a:p>
-            <a:pPr lvl="1"/>
-            <a:r>
-              <a:rPr lang="en-US" sz="1600" dirty="0"/>
-              <a:t>Sample result:</a:t>
-            </a:r>
-          </a:p>
-          <a:p>
-            <a:pPr lvl="2"/>
-            <a:r>
-              <a:rPr lang="en-US" sz="1400" dirty="0"/>
-              <a:t>We are living in a yellow submarine.</a:t>
-            </a:r>
-          </a:p>
-          <a:p>
-            <a:pPr lvl="2"/>
-            <a:r>
-              <a:rPr lang="en-US" sz="1400" dirty="0"/>
-              <a:t>We will move out of it in 5 days.</a:t>
-            </a:r>
-            <a:endParaRPr lang="bg-BG" sz="1400" dirty="0"/>
+            <a:r>
+              <a:rPr lang="en-US" dirty="0"/>
+              <a:t>The text processing in .NET Framework provides ready methods for replacing a substring with another. For example, if we have made one and the same technical mistake when typing the email address of a user in an official document, we can replace it by using the method Replace(…)</a:t>
+            </a:r>
+          </a:p>
+          <a:p>
+            <a:r>
+              <a:rPr lang="en-US" dirty="0"/>
+              <a:t>The method Replace(…) replaces all occurrences of a given substring with another substring, not just the first.</a:t>
+            </a:r>
+            <a:endParaRPr lang="bg-BG" dirty="0"/>
           </a:p>
         </p:txBody>
       </p:sp>
     </p:spTree>
     <p:extLst>
       <p:ext uri="{BB962C8B-B14F-4D97-AF65-F5344CB8AC3E}">
-        <p14:creationId xmlns:p14="http://schemas.microsoft.com/office/powerpoint/2010/main" val="3872015676"/>
+        <p14:creationId xmlns:p14="http://schemas.microsoft.com/office/powerpoint/2010/main" val="2016252895"/>
       </p:ext>
     </p:extLst>
   </p:cSld>
@@ -14034,6 +13928,3378 @@
 </file>
 
 <file path=ppt/slides/slide30.xml><?xml version="1.0" encoding="utf-8"?>
+<p:sld xmlns:a="http://schemas.openxmlformats.org/drawingml/2006/main" xmlns:r="http://schemas.openxmlformats.org/officeDocument/2006/relationships" xmlns:p="http://schemas.openxmlformats.org/presentationml/2006/main">
+  <p:cSld>
+    <p:spTree>
+      <p:nvGrpSpPr>
+        <p:cNvPr id="1" name=""/>
+        <p:cNvGrpSpPr/>
+        <p:nvPr/>
+      </p:nvGrpSpPr>
+      <p:grpSpPr>
+        <a:xfrm>
+          <a:off x="0" y="0"/>
+          <a:ext cx="0" cy="0"/>
+          <a:chOff x="0" y="0"/>
+          <a:chExt cx="0" cy="0"/>
+        </a:xfrm>
+      </p:grpSpPr>
+      <p:sp>
+        <p:nvSpPr>
+          <p:cNvPr id="2" name="Title 1">
+            <a:extLst>
+              <a:ext uri="{FF2B5EF4-FFF2-40B4-BE49-F238E27FC236}">
+                <a16:creationId xmlns:a16="http://schemas.microsoft.com/office/drawing/2014/main" id="{57EFEBE5-DB95-467E-98CE-E6873C8265D3}"/>
+              </a:ext>
+            </a:extLst>
+          </p:cNvPr>
+          <p:cNvSpPr>
+            <a:spLocks noGrp="1"/>
+          </p:cNvSpPr>
+          <p:nvPr>
+            <p:ph type="title"/>
+          </p:nvPr>
+        </p:nvSpPr>
+        <p:spPr/>
+        <p:txBody>
+          <a:bodyPr/>
+          <a:lstStyle/>
+          <a:p>
+            <a:r>
+              <a:rPr lang="en-US" dirty="0"/>
+              <a:t>Replacing a Substring</a:t>
+            </a:r>
+            <a:endParaRPr lang="bg-BG" dirty="0"/>
+          </a:p>
+        </p:txBody>
+      </p:sp>
+      <p:pic>
+        <p:nvPicPr>
+          <p:cNvPr id="5" name="Picture 4">
+            <a:extLst>
+              <a:ext uri="{FF2B5EF4-FFF2-40B4-BE49-F238E27FC236}">
+                <a16:creationId xmlns:a16="http://schemas.microsoft.com/office/drawing/2014/main" id="{2030295F-E62C-4D4A-9B49-3BAD1CC4AEBB}"/>
+              </a:ext>
+            </a:extLst>
+          </p:cNvPr>
+          <p:cNvPicPr>
+            <a:picLocks noChangeAspect="1"/>
+          </p:cNvPicPr>
+          <p:nvPr/>
+        </p:nvPicPr>
+        <p:blipFill>
+          <a:blip r:embed="rId2"/>
+          <a:stretch>
+            <a:fillRect/>
+          </a:stretch>
+        </p:blipFill>
+        <p:spPr>
+          <a:xfrm>
+            <a:off x="1524000" y="2067734"/>
+            <a:ext cx="9177329" cy="3081439"/>
+          </a:xfrm>
+          <a:prstGeom prst="rect">
+            <a:avLst/>
+          </a:prstGeom>
+        </p:spPr>
+      </p:pic>
+    </p:spTree>
+    <p:extLst>
+      <p:ext uri="{BB962C8B-B14F-4D97-AF65-F5344CB8AC3E}">
+        <p14:creationId xmlns:p14="http://schemas.microsoft.com/office/powerpoint/2010/main" val="3211963057"/>
+      </p:ext>
+    </p:extLst>
+  </p:cSld>
+  <p:clrMapOvr>
+    <a:masterClrMapping/>
+  </p:clrMapOvr>
+</p:sld>
+</file>
+
+<file path=ppt/slides/slide31.xml><?xml version="1.0" encoding="utf-8"?>
+<p:sld xmlns:a="http://schemas.openxmlformats.org/drawingml/2006/main" xmlns:r="http://schemas.openxmlformats.org/officeDocument/2006/relationships" xmlns:p="http://schemas.openxmlformats.org/presentationml/2006/main">
+  <p:cSld>
+    <p:spTree>
+      <p:nvGrpSpPr>
+        <p:cNvPr id="1" name=""/>
+        <p:cNvGrpSpPr/>
+        <p:nvPr/>
+      </p:nvGrpSpPr>
+      <p:grpSpPr>
+        <a:xfrm>
+          <a:off x="0" y="0"/>
+          <a:ext cx="0" cy="0"/>
+          <a:chOff x="0" y="0"/>
+          <a:chExt cx="0" cy="0"/>
+        </a:xfrm>
+      </p:grpSpPr>
+      <p:sp>
+        <p:nvSpPr>
+          <p:cNvPr id="2" name="Title 1">
+            <a:extLst>
+              <a:ext uri="{FF2B5EF4-FFF2-40B4-BE49-F238E27FC236}">
+                <a16:creationId xmlns:a16="http://schemas.microsoft.com/office/drawing/2014/main" id="{D74B87A9-A410-4D1F-9045-F0362C454C35}"/>
+              </a:ext>
+            </a:extLst>
+          </p:cNvPr>
+          <p:cNvSpPr>
+            <a:spLocks noGrp="1"/>
+          </p:cNvSpPr>
+          <p:nvPr>
+            <p:ph type="title"/>
+          </p:nvPr>
+        </p:nvSpPr>
+        <p:spPr/>
+        <p:txBody>
+          <a:bodyPr/>
+          <a:lstStyle/>
+          <a:p>
+            <a:r>
+              <a:rPr lang="en-US" dirty="0"/>
+              <a:t>Regular Expressions</a:t>
+            </a:r>
+            <a:endParaRPr lang="bg-BG" dirty="0"/>
+          </a:p>
+        </p:txBody>
+      </p:sp>
+      <p:sp>
+        <p:nvSpPr>
+          <p:cNvPr id="3" name="Text Placeholder 2">
+            <a:extLst>
+              <a:ext uri="{FF2B5EF4-FFF2-40B4-BE49-F238E27FC236}">
+                <a16:creationId xmlns:a16="http://schemas.microsoft.com/office/drawing/2014/main" id="{8FD8E3CC-0EC0-4BC3-BD5C-57EED58A29A1}"/>
+              </a:ext>
+            </a:extLst>
+          </p:cNvPr>
+          <p:cNvSpPr>
+            <a:spLocks noGrp="1"/>
+          </p:cNvSpPr>
+          <p:nvPr>
+            <p:ph type="body" idx="1"/>
+          </p:nvPr>
+        </p:nvSpPr>
+        <p:spPr/>
+        <p:txBody>
+          <a:bodyPr/>
+          <a:lstStyle/>
+          <a:p>
+            <a:r>
+              <a:rPr lang="en-US" dirty="0"/>
+              <a:t>The regular expressions are a powerful tool for text processing and allow searching matches by a pattern. An example for a pattern is [A-Z0-9]+, which means not an empty series of capital Latin letters and numbers.</a:t>
+            </a:r>
+          </a:p>
+          <a:p>
+            <a:r>
+              <a:rPr lang="en-US" dirty="0"/>
+              <a:t>Regular expressions make text processing easier and more accurate:</a:t>
+            </a:r>
+          </a:p>
+          <a:p>
+            <a:pPr lvl="1"/>
+            <a:r>
+              <a:rPr lang="en-US" dirty="0"/>
+              <a:t>extracting some resources from texts, </a:t>
+            </a:r>
+          </a:p>
+          <a:p>
+            <a:pPr lvl="1"/>
+            <a:r>
+              <a:rPr lang="en-US" dirty="0"/>
+              <a:t>searching for phone numbers, </a:t>
+            </a:r>
+          </a:p>
+          <a:p>
+            <a:pPr lvl="1"/>
+            <a:r>
+              <a:rPr lang="en-US" dirty="0"/>
+              <a:t>finding email addresses in a text, </a:t>
+            </a:r>
+          </a:p>
+          <a:p>
+            <a:pPr lvl="1"/>
+            <a:r>
+              <a:rPr lang="en-US" dirty="0"/>
+              <a:t>splitting all the words in a sentence, </a:t>
+            </a:r>
+          </a:p>
+          <a:p>
+            <a:pPr lvl="1"/>
+            <a:r>
+              <a:rPr lang="en-US" dirty="0"/>
+              <a:t>data validation, etc.</a:t>
+            </a:r>
+            <a:endParaRPr lang="bg-BG" dirty="0"/>
+          </a:p>
+        </p:txBody>
+      </p:sp>
+    </p:spTree>
+    <p:extLst>
+      <p:ext uri="{BB962C8B-B14F-4D97-AF65-F5344CB8AC3E}">
+        <p14:creationId xmlns:p14="http://schemas.microsoft.com/office/powerpoint/2010/main" val="3147222528"/>
+      </p:ext>
+    </p:extLst>
+  </p:cSld>
+  <p:clrMapOvr>
+    <a:masterClrMapping/>
+  </p:clrMapOvr>
+</p:sld>
+</file>
+
+<file path=ppt/slides/slide32.xml><?xml version="1.0" encoding="utf-8"?>
+<p:sld xmlns:a="http://schemas.openxmlformats.org/drawingml/2006/main" xmlns:r="http://schemas.openxmlformats.org/officeDocument/2006/relationships" xmlns:p="http://schemas.openxmlformats.org/presentationml/2006/main">
+  <p:cSld>
+    <p:spTree>
+      <p:nvGrpSpPr>
+        <p:cNvPr id="1" name=""/>
+        <p:cNvGrpSpPr/>
+        <p:nvPr/>
+      </p:nvGrpSpPr>
+      <p:grpSpPr>
+        <a:xfrm>
+          <a:off x="0" y="0"/>
+          <a:ext cx="0" cy="0"/>
+          <a:chOff x="0" y="0"/>
+          <a:chExt cx="0" cy="0"/>
+        </a:xfrm>
+      </p:grpSpPr>
+      <p:sp>
+        <p:nvSpPr>
+          <p:cNvPr id="2" name="Title 1">
+            <a:extLst>
+              <a:ext uri="{FF2B5EF4-FFF2-40B4-BE49-F238E27FC236}">
+                <a16:creationId xmlns:a16="http://schemas.microsoft.com/office/drawing/2014/main" id="{64673166-5FCA-4B8A-A7D5-3CF79B45D125}"/>
+              </a:ext>
+            </a:extLst>
+          </p:cNvPr>
+          <p:cNvSpPr>
+            <a:spLocks noGrp="1"/>
+          </p:cNvSpPr>
+          <p:nvPr>
+            <p:ph type="title"/>
+          </p:nvPr>
+        </p:nvSpPr>
+        <p:spPr/>
+        <p:txBody>
+          <a:bodyPr/>
+          <a:lstStyle/>
+          <a:p>
+            <a:r>
+              <a:rPr lang="en-US" dirty="0"/>
+              <a:t>Regular Expressions – Example</a:t>
+            </a:r>
+            <a:endParaRPr lang="bg-BG" dirty="0"/>
+          </a:p>
+        </p:txBody>
+      </p:sp>
+      <p:sp>
+        <p:nvSpPr>
+          <p:cNvPr id="3" name="Text Placeholder 2">
+            <a:extLst>
+              <a:ext uri="{FF2B5EF4-FFF2-40B4-BE49-F238E27FC236}">
+                <a16:creationId xmlns:a16="http://schemas.microsoft.com/office/drawing/2014/main" id="{AD701E2F-2584-4D78-B0EF-E693121A92E8}"/>
+              </a:ext>
+            </a:extLst>
+          </p:cNvPr>
+          <p:cNvSpPr>
+            <a:spLocks noGrp="1"/>
+          </p:cNvSpPr>
+          <p:nvPr>
+            <p:ph type="body" idx="1"/>
+          </p:nvPr>
+        </p:nvSpPr>
+        <p:spPr>
+          <a:xfrm>
+            <a:off x="1524000" y="1828800"/>
+            <a:ext cx="9144000" cy="1926077"/>
+          </a:xfrm>
+        </p:spPr>
+        <p:txBody>
+          <a:bodyPr/>
+          <a:lstStyle/>
+          <a:p>
+            <a:r>
+              <a:rPr lang="en-US" dirty="0"/>
+              <a:t>If we have an official document that is used only in the office and it contains a lot of personal data, then we should censor it before sending it to the client.</a:t>
+            </a:r>
+          </a:p>
+          <a:p>
+            <a:r>
+              <a:rPr lang="en-US" dirty="0"/>
+              <a:t>For example, we can censor all mobile numbers and replace them with asterisks. By using regular expressions, this could be done as follows:</a:t>
+            </a:r>
+            <a:endParaRPr lang="bg-BG" dirty="0"/>
+          </a:p>
+        </p:txBody>
+      </p:sp>
+      <p:pic>
+        <p:nvPicPr>
+          <p:cNvPr id="5" name="Picture 4">
+            <a:extLst>
+              <a:ext uri="{FF2B5EF4-FFF2-40B4-BE49-F238E27FC236}">
+                <a16:creationId xmlns:a16="http://schemas.microsoft.com/office/drawing/2014/main" id="{689B7BA9-F5AD-4239-A286-FBF9FDC6FCDF}"/>
+              </a:ext>
+            </a:extLst>
+          </p:cNvPr>
+          <p:cNvPicPr>
+            <a:picLocks noChangeAspect="1"/>
+          </p:cNvPicPr>
+          <p:nvPr/>
+        </p:nvPicPr>
+        <p:blipFill>
+          <a:blip r:embed="rId2"/>
+          <a:stretch>
+            <a:fillRect/>
+          </a:stretch>
+        </p:blipFill>
+        <p:spPr>
+          <a:xfrm>
+            <a:off x="294971" y="3644632"/>
+            <a:ext cx="7500127" cy="1277314"/>
+          </a:xfrm>
+          <a:prstGeom prst="rect">
+            <a:avLst/>
+          </a:prstGeom>
+        </p:spPr>
+      </p:pic>
+      <p:pic>
+        <p:nvPicPr>
+          <p:cNvPr id="7" name="Picture 6">
+            <a:extLst>
+              <a:ext uri="{FF2B5EF4-FFF2-40B4-BE49-F238E27FC236}">
+                <a16:creationId xmlns:a16="http://schemas.microsoft.com/office/drawing/2014/main" id="{682C2A3B-C428-42FC-AAA0-218F18E8C723}"/>
+              </a:ext>
+            </a:extLst>
+          </p:cNvPr>
+          <p:cNvPicPr>
+            <a:picLocks noChangeAspect="1"/>
+          </p:cNvPicPr>
+          <p:nvPr/>
+        </p:nvPicPr>
+        <p:blipFill>
+          <a:blip r:embed="rId3"/>
+          <a:stretch>
+            <a:fillRect/>
+          </a:stretch>
+        </p:blipFill>
+        <p:spPr>
+          <a:xfrm>
+            <a:off x="5007921" y="5094459"/>
+            <a:ext cx="6534150" cy="1409700"/>
+          </a:xfrm>
+          <a:prstGeom prst="rect">
+            <a:avLst/>
+          </a:prstGeom>
+        </p:spPr>
+      </p:pic>
+    </p:spTree>
+    <p:extLst>
+      <p:ext uri="{BB962C8B-B14F-4D97-AF65-F5344CB8AC3E}">
+        <p14:creationId xmlns:p14="http://schemas.microsoft.com/office/powerpoint/2010/main" val="1028423224"/>
+      </p:ext>
+    </p:extLst>
+  </p:cSld>
+  <p:clrMapOvr>
+    <a:masterClrMapping/>
+  </p:clrMapOvr>
+</p:sld>
+</file>
+
+<file path=ppt/slides/slide33.xml><?xml version="1.0" encoding="utf-8"?>
+<p:sld xmlns:a="http://schemas.openxmlformats.org/drawingml/2006/main" xmlns:r="http://schemas.openxmlformats.org/officeDocument/2006/relationships" xmlns:p="http://schemas.openxmlformats.org/presentationml/2006/main">
+  <p:cSld>
+    <p:spTree>
+      <p:nvGrpSpPr>
+        <p:cNvPr id="1" name=""/>
+        <p:cNvGrpSpPr/>
+        <p:nvPr/>
+      </p:nvGrpSpPr>
+      <p:grpSpPr>
+        <a:xfrm>
+          <a:off x="0" y="0"/>
+          <a:ext cx="0" cy="0"/>
+          <a:chOff x="0" y="0"/>
+          <a:chExt cx="0" cy="0"/>
+        </a:xfrm>
+      </p:grpSpPr>
+      <p:sp>
+        <p:nvSpPr>
+          <p:cNvPr id="2" name="Title 1">
+            <a:extLst>
+              <a:ext uri="{FF2B5EF4-FFF2-40B4-BE49-F238E27FC236}">
+                <a16:creationId xmlns:a16="http://schemas.microsoft.com/office/drawing/2014/main" id="{4286DEA4-5594-43FB-A32B-B99DD8BAAE55}"/>
+              </a:ext>
+            </a:extLst>
+          </p:cNvPr>
+          <p:cNvSpPr>
+            <a:spLocks noGrp="1"/>
+          </p:cNvSpPr>
+          <p:nvPr>
+            <p:ph type="title"/>
+          </p:nvPr>
+        </p:nvSpPr>
+        <p:spPr/>
+        <p:txBody>
+          <a:bodyPr/>
+          <a:lstStyle/>
+          <a:p>
+            <a:r>
+              <a:rPr lang="en-US" dirty="0" err="1"/>
+              <a:t>Regex.Replace</a:t>
+            </a:r>
+            <a:r>
+              <a:rPr lang="en-US" dirty="0"/>
+              <a:t>(…)</a:t>
+            </a:r>
+            <a:endParaRPr lang="bg-BG" dirty="0"/>
+          </a:p>
+        </p:txBody>
+      </p:sp>
+      <p:sp>
+        <p:nvSpPr>
+          <p:cNvPr id="3" name="Text Placeholder 2">
+            <a:extLst>
+              <a:ext uri="{FF2B5EF4-FFF2-40B4-BE49-F238E27FC236}">
+                <a16:creationId xmlns:a16="http://schemas.microsoft.com/office/drawing/2014/main" id="{499538E2-A7D0-4175-AC52-E30686498865}"/>
+              </a:ext>
+            </a:extLst>
+          </p:cNvPr>
+          <p:cNvSpPr>
+            <a:spLocks noGrp="1"/>
+          </p:cNvSpPr>
+          <p:nvPr>
+            <p:ph type="body" idx="1"/>
+          </p:nvPr>
+        </p:nvSpPr>
+        <p:spPr>
+          <a:xfrm>
+            <a:off x="1523999" y="1828800"/>
+            <a:ext cx="10194587" cy="4267200"/>
+          </a:xfrm>
+        </p:spPr>
+        <p:txBody>
+          <a:bodyPr/>
+          <a:lstStyle/>
+          <a:p>
+            <a:r>
+              <a:rPr lang="en-US" dirty="0"/>
+              <a:t>Class </a:t>
+            </a:r>
+            <a:r>
+              <a:rPr lang="en-US" dirty="0" err="1"/>
+              <a:t>System.Text.RegularExpressions.Regex</a:t>
+            </a:r>
+            <a:r>
+              <a:rPr lang="en-US" dirty="0"/>
+              <a:t>, which is intended for use with regular expressions in .NET Framework.</a:t>
+            </a:r>
+          </a:p>
+          <a:p>
+            <a:r>
+              <a:rPr lang="en-US" dirty="0"/>
+              <a:t>The variable, which imitates the document text, is </a:t>
+            </a:r>
+            <a:r>
+              <a:rPr lang="en-US" b="1" u="sng" dirty="0"/>
+              <a:t>doc</a:t>
+            </a:r>
+            <a:r>
+              <a:rPr lang="en-US" dirty="0"/>
+              <a:t>.</a:t>
+            </a:r>
+          </a:p>
+          <a:p>
+            <a:r>
+              <a:rPr lang="en-US" dirty="0"/>
+              <a:t>Phones are saved in the format: "08 + 8 digits",</a:t>
+            </a:r>
+          </a:p>
+          <a:p>
+            <a:r>
+              <a:rPr lang="en-US" dirty="0"/>
+              <a:t>The method </a:t>
+            </a:r>
+            <a:r>
+              <a:rPr lang="en-US" dirty="0" err="1"/>
+              <a:t>Regex.Replace</a:t>
+            </a:r>
+            <a:r>
+              <a:rPr lang="en-US" dirty="0"/>
+              <a:t>(…) finds all matches by a given format and replaces them with: "08********".</a:t>
+            </a:r>
+          </a:p>
+          <a:p>
+            <a:r>
+              <a:rPr lang="en-US" dirty="0"/>
+              <a:t>The regular expression that finds all of the numbers is the following: "(08)[0-9]{8}". It finds all substrings in the text, constructed by the constant "08“ and followed exactly by 8 characters ranging from 0 to 9.</a:t>
+            </a:r>
+            <a:endParaRPr lang="bg-BG" dirty="0"/>
+          </a:p>
+        </p:txBody>
+      </p:sp>
+    </p:spTree>
+    <p:extLst>
+      <p:ext uri="{BB962C8B-B14F-4D97-AF65-F5344CB8AC3E}">
+        <p14:creationId xmlns:p14="http://schemas.microsoft.com/office/powerpoint/2010/main" val="2686318855"/>
+      </p:ext>
+    </p:extLst>
+  </p:cSld>
+  <p:clrMapOvr>
+    <a:masterClrMapping/>
+  </p:clrMapOvr>
+</p:sld>
+</file>
+
+<file path=ppt/slides/slide34.xml><?xml version="1.0" encoding="utf-8"?>
+<p:sld xmlns:a="http://schemas.openxmlformats.org/drawingml/2006/main" xmlns:r="http://schemas.openxmlformats.org/officeDocument/2006/relationships" xmlns:p="http://schemas.openxmlformats.org/presentationml/2006/main">
+  <p:cSld>
+    <p:spTree>
+      <p:nvGrpSpPr>
+        <p:cNvPr id="1" name=""/>
+        <p:cNvGrpSpPr/>
+        <p:nvPr/>
+      </p:nvGrpSpPr>
+      <p:grpSpPr>
+        <a:xfrm>
+          <a:off x="0" y="0"/>
+          <a:ext cx="0" cy="0"/>
+          <a:chOff x="0" y="0"/>
+          <a:chExt cx="0" cy="0"/>
+        </a:xfrm>
+      </p:grpSpPr>
+      <p:sp>
+        <p:nvSpPr>
+          <p:cNvPr id="2" name="Title 1">
+            <a:extLst>
+              <a:ext uri="{FF2B5EF4-FFF2-40B4-BE49-F238E27FC236}">
+                <a16:creationId xmlns:a16="http://schemas.microsoft.com/office/drawing/2014/main" id="{5029B37A-4CFE-49C2-9466-F0B1C2A82A49}"/>
+              </a:ext>
+            </a:extLst>
+          </p:cNvPr>
+          <p:cNvSpPr>
+            <a:spLocks noGrp="1"/>
+          </p:cNvSpPr>
+          <p:nvPr>
+            <p:ph type="title"/>
+          </p:nvPr>
+        </p:nvSpPr>
+        <p:spPr/>
+        <p:txBody>
+          <a:bodyPr/>
+          <a:lstStyle/>
+          <a:p>
+            <a:r>
+              <a:rPr lang="en-US" dirty="0" err="1"/>
+              <a:t>Regex.Replace</a:t>
+            </a:r>
+            <a:r>
+              <a:rPr lang="en-US" dirty="0"/>
+              <a:t>(…)</a:t>
+            </a:r>
+            <a:endParaRPr lang="bg-BG" dirty="0"/>
+          </a:p>
+        </p:txBody>
+      </p:sp>
+      <p:sp>
+        <p:nvSpPr>
+          <p:cNvPr id="3" name="Text Placeholder 2">
+            <a:extLst>
+              <a:ext uri="{FF2B5EF4-FFF2-40B4-BE49-F238E27FC236}">
+                <a16:creationId xmlns:a16="http://schemas.microsoft.com/office/drawing/2014/main" id="{BF23B486-60AB-4765-8281-F6A1654AF835}"/>
+              </a:ext>
+            </a:extLst>
+          </p:cNvPr>
+          <p:cNvSpPr>
+            <a:spLocks noGrp="1"/>
+          </p:cNvSpPr>
+          <p:nvPr>
+            <p:ph type="body" idx="1"/>
+          </p:nvPr>
+        </p:nvSpPr>
+        <p:spPr/>
+        <p:txBody>
+          <a:bodyPr/>
+          <a:lstStyle/>
+          <a:p>
+            <a:r>
+              <a:rPr lang="en-US" dirty="0"/>
+              <a:t>The literal "08" is surrounded by parentheses. They serve for forming a separate group in the regular expression. The groups can be used for handling only a certain part of the expression instead of the entire expression. In our example, the group is used in the substitution. </a:t>
+            </a:r>
+          </a:p>
+          <a:p>
+            <a:r>
+              <a:rPr lang="en-US" dirty="0"/>
+              <a:t>Through it, the founded matches are replaced by the pattern "$1********", i.e. the text which was found in the first group of the regular expression ($1) + 8 consecutive asterisks for censorship. </a:t>
+            </a:r>
+          </a:p>
+          <a:p>
+            <a:r>
+              <a:rPr lang="en-US" dirty="0"/>
+              <a:t>As the defined group is always a constant (08), so the text replaced will always be: 08 ********.</a:t>
+            </a:r>
+            <a:endParaRPr lang="bg-BG" dirty="0"/>
+          </a:p>
+        </p:txBody>
+      </p:sp>
+    </p:spTree>
+    <p:extLst>
+      <p:ext uri="{BB962C8B-B14F-4D97-AF65-F5344CB8AC3E}">
+        <p14:creationId xmlns:p14="http://schemas.microsoft.com/office/powerpoint/2010/main" val="3125834187"/>
+      </p:ext>
+    </p:extLst>
+  </p:cSld>
+  <p:clrMapOvr>
+    <a:masterClrMapping/>
+  </p:clrMapOvr>
+</p:sld>
+</file>
+
+<file path=ppt/slides/slide35.xml><?xml version="1.0" encoding="utf-8"?>
+<p:sld xmlns:a="http://schemas.openxmlformats.org/drawingml/2006/main" xmlns:r="http://schemas.openxmlformats.org/officeDocument/2006/relationships" xmlns:p="http://schemas.openxmlformats.org/presentationml/2006/main">
+  <p:cSld>
+    <p:spTree>
+      <p:nvGrpSpPr>
+        <p:cNvPr id="1" name=""/>
+        <p:cNvGrpSpPr/>
+        <p:nvPr/>
+      </p:nvGrpSpPr>
+      <p:grpSpPr>
+        <a:xfrm>
+          <a:off x="0" y="0"/>
+          <a:ext cx="0" cy="0"/>
+          <a:chOff x="0" y="0"/>
+          <a:chExt cx="0" cy="0"/>
+        </a:xfrm>
+      </p:grpSpPr>
+      <p:sp>
+        <p:nvSpPr>
+          <p:cNvPr id="2" name="Title 1">
+            <a:extLst>
+              <a:ext uri="{FF2B5EF4-FFF2-40B4-BE49-F238E27FC236}">
+                <a16:creationId xmlns:a16="http://schemas.microsoft.com/office/drawing/2014/main" id="{E9A3D858-1D47-4F2E-9508-D8389334EDF8}"/>
+              </a:ext>
+            </a:extLst>
+          </p:cNvPr>
+          <p:cNvSpPr>
+            <a:spLocks noGrp="1"/>
+          </p:cNvSpPr>
+          <p:nvPr>
+            <p:ph type="title"/>
+          </p:nvPr>
+        </p:nvSpPr>
+        <p:spPr/>
+        <p:txBody>
+          <a:bodyPr/>
+          <a:lstStyle/>
+          <a:p>
+            <a:r>
+              <a:rPr lang="en-US" sz="3200" dirty="0"/>
+              <a:t>Removing Unnecessary Characters at the Beginning</a:t>
+            </a:r>
+            <a:r>
+              <a:rPr lang="bg-BG" sz="3200" dirty="0"/>
+              <a:t> </a:t>
+            </a:r>
+            <a:r>
+              <a:rPr lang="en-US" sz="3200" dirty="0"/>
+              <a:t>and at the End of a String</a:t>
+            </a:r>
+            <a:endParaRPr lang="bg-BG" sz="3200" dirty="0"/>
+          </a:p>
+        </p:txBody>
+      </p:sp>
+      <p:pic>
+        <p:nvPicPr>
+          <p:cNvPr id="5" name="Picture 4">
+            <a:extLst>
+              <a:ext uri="{FF2B5EF4-FFF2-40B4-BE49-F238E27FC236}">
+                <a16:creationId xmlns:a16="http://schemas.microsoft.com/office/drawing/2014/main" id="{3936CA7D-DE88-4CBF-B206-C364FD0017F6}"/>
+              </a:ext>
+            </a:extLst>
+          </p:cNvPr>
+          <p:cNvPicPr>
+            <a:picLocks noChangeAspect="1"/>
+          </p:cNvPicPr>
+          <p:nvPr/>
+        </p:nvPicPr>
+        <p:blipFill>
+          <a:blip r:embed="rId2"/>
+          <a:stretch>
+            <a:fillRect/>
+          </a:stretch>
+        </p:blipFill>
+        <p:spPr>
+          <a:xfrm>
+            <a:off x="1617527" y="1722201"/>
+            <a:ext cx="6505575" cy="495300"/>
+          </a:xfrm>
+          <a:prstGeom prst="rect">
+            <a:avLst/>
+          </a:prstGeom>
+        </p:spPr>
+      </p:pic>
+      <p:pic>
+        <p:nvPicPr>
+          <p:cNvPr id="7" name="Picture 6">
+            <a:extLst>
+              <a:ext uri="{FF2B5EF4-FFF2-40B4-BE49-F238E27FC236}">
+                <a16:creationId xmlns:a16="http://schemas.microsoft.com/office/drawing/2014/main" id="{DA5F690D-0901-4BF0-9005-56EAE8E39385}"/>
+              </a:ext>
+            </a:extLst>
+          </p:cNvPr>
+          <p:cNvPicPr>
+            <a:picLocks noChangeAspect="1"/>
+          </p:cNvPicPr>
+          <p:nvPr/>
+        </p:nvPicPr>
+        <p:blipFill>
+          <a:blip r:embed="rId3"/>
+          <a:stretch>
+            <a:fillRect/>
+          </a:stretch>
+        </p:blipFill>
+        <p:spPr>
+          <a:xfrm>
+            <a:off x="1612764" y="2588165"/>
+            <a:ext cx="6515100" cy="514350"/>
+          </a:xfrm>
+          <a:prstGeom prst="rect">
+            <a:avLst/>
+          </a:prstGeom>
+        </p:spPr>
+      </p:pic>
+      <p:pic>
+        <p:nvPicPr>
+          <p:cNvPr id="9" name="Picture 8">
+            <a:extLst>
+              <a:ext uri="{FF2B5EF4-FFF2-40B4-BE49-F238E27FC236}">
+                <a16:creationId xmlns:a16="http://schemas.microsoft.com/office/drawing/2014/main" id="{2565D2A2-96B3-4EE9-88B1-97841DE59622}"/>
+              </a:ext>
+            </a:extLst>
+          </p:cNvPr>
+          <p:cNvPicPr>
+            <a:picLocks noChangeAspect="1"/>
+          </p:cNvPicPr>
+          <p:nvPr/>
+        </p:nvPicPr>
+        <p:blipFill>
+          <a:blip r:embed="rId4"/>
+          <a:stretch>
+            <a:fillRect/>
+          </a:stretch>
+        </p:blipFill>
+        <p:spPr>
+          <a:xfrm>
+            <a:off x="1612764" y="4502993"/>
+            <a:ext cx="6562725" cy="1133475"/>
+          </a:xfrm>
+          <a:prstGeom prst="rect">
+            <a:avLst/>
+          </a:prstGeom>
+        </p:spPr>
+      </p:pic>
+    </p:spTree>
+    <p:extLst>
+      <p:ext uri="{BB962C8B-B14F-4D97-AF65-F5344CB8AC3E}">
+        <p14:creationId xmlns:p14="http://schemas.microsoft.com/office/powerpoint/2010/main" val="2411504258"/>
+      </p:ext>
+    </p:extLst>
+  </p:cSld>
+  <p:clrMapOvr>
+    <a:masterClrMapping/>
+  </p:clrMapOvr>
+</p:sld>
+</file>
+
+<file path=ppt/slides/slide36.xml><?xml version="1.0" encoding="utf-8"?>
+<p:sld xmlns:a="http://schemas.openxmlformats.org/drawingml/2006/main" xmlns:r="http://schemas.openxmlformats.org/officeDocument/2006/relationships" xmlns:p="http://schemas.openxmlformats.org/presentationml/2006/main">
+  <p:cSld>
+    <p:spTree>
+      <p:nvGrpSpPr>
+        <p:cNvPr id="1" name=""/>
+        <p:cNvGrpSpPr/>
+        <p:nvPr/>
+      </p:nvGrpSpPr>
+      <p:grpSpPr>
+        <a:xfrm>
+          <a:off x="0" y="0"/>
+          <a:ext cx="0" cy="0"/>
+          <a:chOff x="0" y="0"/>
+          <a:chExt cx="0" cy="0"/>
+        </a:xfrm>
+      </p:grpSpPr>
+      <p:sp>
+        <p:nvSpPr>
+          <p:cNvPr id="2" name="Title 1">
+            <a:extLst>
+              <a:ext uri="{FF2B5EF4-FFF2-40B4-BE49-F238E27FC236}">
+                <a16:creationId xmlns:a16="http://schemas.microsoft.com/office/drawing/2014/main" id="{C9DE1F3E-FB43-4199-A09F-70DC15FBF3C9}"/>
+              </a:ext>
+            </a:extLst>
+          </p:cNvPr>
+          <p:cNvSpPr>
+            <a:spLocks noGrp="1"/>
+          </p:cNvSpPr>
+          <p:nvPr>
+            <p:ph type="title"/>
+          </p:nvPr>
+        </p:nvSpPr>
+        <p:spPr/>
+        <p:txBody>
+          <a:bodyPr/>
+          <a:lstStyle/>
+          <a:p>
+            <a:r>
+              <a:rPr lang="en-US" dirty="0"/>
+              <a:t>Regex</a:t>
+            </a:r>
+            <a:endParaRPr lang="bg-BG" dirty="0"/>
+          </a:p>
+        </p:txBody>
+      </p:sp>
+      <p:sp>
+        <p:nvSpPr>
+          <p:cNvPr id="3" name="Text Placeholder 2">
+            <a:extLst>
+              <a:ext uri="{FF2B5EF4-FFF2-40B4-BE49-F238E27FC236}">
+                <a16:creationId xmlns:a16="http://schemas.microsoft.com/office/drawing/2014/main" id="{B0775252-6A2F-479E-99A0-0C4CF8AFD204}"/>
+              </a:ext>
+            </a:extLst>
+          </p:cNvPr>
+          <p:cNvSpPr>
+            <a:spLocks noGrp="1"/>
+          </p:cNvSpPr>
+          <p:nvPr>
+            <p:ph type="body" idx="1"/>
+          </p:nvPr>
+        </p:nvSpPr>
+        <p:spPr/>
+        <p:txBody>
+          <a:bodyPr/>
+          <a:lstStyle/>
+          <a:p>
+            <a:r>
+              <a:rPr lang="en-US" dirty="0"/>
+              <a:t>Anyone who wants to learn more, can search for articles, books and tutorials in order to learn how to construct regular expressions, how to look for matches, how validation is made, how to make substitutions by patterns, etc. In particular, we recommend you to visit the websites </a:t>
+            </a:r>
+            <a:r>
+              <a:rPr lang="en-US" dirty="0">
+                <a:hlinkClick r:id="rId2"/>
+              </a:rPr>
+              <a:t>http://www.regular-expressions.info</a:t>
+            </a:r>
+            <a:r>
+              <a:rPr lang="en-US" dirty="0"/>
+              <a:t>  and </a:t>
+            </a:r>
+            <a:r>
+              <a:rPr lang="en-US" dirty="0">
+                <a:hlinkClick r:id="rId3"/>
+              </a:rPr>
+              <a:t>http://regexlib.com</a:t>
+            </a:r>
+            <a:r>
+              <a:rPr lang="en-US" dirty="0"/>
+              <a:t> </a:t>
+            </a:r>
+          </a:p>
+          <a:p>
+            <a:r>
+              <a:rPr lang="en-US" dirty="0"/>
+              <a:t>More information about the classes in .NET Framework for working with regular expressions can be found at: </a:t>
+            </a:r>
+            <a:r>
+              <a:rPr lang="en-US" dirty="0">
+                <a:hlinkClick r:id="rId4"/>
+              </a:rPr>
+              <a:t>http://msdn.microsoft.com/enus/library/system.text.regularexpressions.regex%28VS.100%29.aspx</a:t>
+            </a:r>
+            <a:r>
+              <a:rPr lang="en-US" dirty="0"/>
+              <a:t> </a:t>
+            </a:r>
+          </a:p>
+          <a:p>
+            <a:r>
+              <a:rPr lang="en-US" dirty="0"/>
+              <a:t>Regex cheat sheet </a:t>
+            </a:r>
+            <a:r>
+              <a:rPr lang="en-US" dirty="0">
+                <a:hlinkClick r:id="rId5"/>
+              </a:rPr>
+              <a:t>https://cheatography.com/davechild/cheat-sheets/regular-expressions/</a:t>
+            </a:r>
+            <a:r>
+              <a:rPr lang="en-US" dirty="0"/>
+              <a:t> </a:t>
+            </a:r>
+            <a:endParaRPr lang="bg-BG" dirty="0"/>
+          </a:p>
+        </p:txBody>
+      </p:sp>
+    </p:spTree>
+    <p:extLst>
+      <p:ext uri="{BB962C8B-B14F-4D97-AF65-F5344CB8AC3E}">
+        <p14:creationId xmlns:p14="http://schemas.microsoft.com/office/powerpoint/2010/main" val="133744057"/>
+      </p:ext>
+    </p:extLst>
+  </p:cSld>
+  <p:clrMapOvr>
+    <a:masterClrMapping/>
+  </p:clrMapOvr>
+</p:sld>
+</file>
+
+<file path=ppt/slides/slide37.xml><?xml version="1.0" encoding="utf-8"?>
+<p:sld xmlns:a="http://schemas.openxmlformats.org/drawingml/2006/main" xmlns:r="http://schemas.openxmlformats.org/officeDocument/2006/relationships" xmlns:p="http://schemas.openxmlformats.org/presentationml/2006/main">
+  <p:cSld>
+    <p:spTree>
+      <p:nvGrpSpPr>
+        <p:cNvPr id="1" name=""/>
+        <p:cNvGrpSpPr/>
+        <p:nvPr/>
+      </p:nvGrpSpPr>
+      <p:grpSpPr>
+        <a:xfrm>
+          <a:off x="0" y="0"/>
+          <a:ext cx="0" cy="0"/>
+          <a:chOff x="0" y="0"/>
+          <a:chExt cx="0" cy="0"/>
+        </a:xfrm>
+      </p:grpSpPr>
+      <p:sp>
+        <p:nvSpPr>
+          <p:cNvPr id="2" name="Title 1">
+            <a:extLst>
+              <a:ext uri="{FF2B5EF4-FFF2-40B4-BE49-F238E27FC236}">
+                <a16:creationId xmlns:a16="http://schemas.microsoft.com/office/drawing/2014/main" id="{BEBE4D4B-04D0-4919-91FF-C7524E583319}"/>
+              </a:ext>
+            </a:extLst>
+          </p:cNvPr>
+          <p:cNvSpPr>
+            <a:spLocks noGrp="1"/>
+          </p:cNvSpPr>
+          <p:nvPr>
+            <p:ph type="title"/>
+          </p:nvPr>
+        </p:nvSpPr>
+        <p:spPr/>
+        <p:txBody>
+          <a:bodyPr/>
+          <a:lstStyle/>
+          <a:p>
+            <a:r>
+              <a:rPr lang="en-US" dirty="0"/>
+              <a:t>Constructing Strings: the StringBuilder Class</a:t>
+            </a:r>
+            <a:endParaRPr lang="bg-BG" dirty="0"/>
+          </a:p>
+        </p:txBody>
+      </p:sp>
+      <p:sp>
+        <p:nvSpPr>
+          <p:cNvPr id="3" name="Text Placeholder 2">
+            <a:extLst>
+              <a:ext uri="{FF2B5EF4-FFF2-40B4-BE49-F238E27FC236}">
+                <a16:creationId xmlns:a16="http://schemas.microsoft.com/office/drawing/2014/main" id="{3B20C081-3A5A-4F13-9C09-7F05C4303453}"/>
+              </a:ext>
+            </a:extLst>
+          </p:cNvPr>
+          <p:cNvSpPr>
+            <a:spLocks noGrp="1"/>
+          </p:cNvSpPr>
+          <p:nvPr>
+            <p:ph type="body" idx="1"/>
+          </p:nvPr>
+        </p:nvSpPr>
+        <p:spPr/>
+        <p:txBody>
+          <a:bodyPr/>
+          <a:lstStyle/>
+          <a:p>
+            <a:r>
+              <a:rPr lang="en-US" dirty="0"/>
+              <a:t>As explained above, strings in C# are immutable. </a:t>
+            </a:r>
+            <a:endParaRPr lang="bg-BG" dirty="0"/>
+          </a:p>
+          <a:p>
+            <a:r>
+              <a:rPr lang="en-US" dirty="0"/>
+              <a:t>This means that any</a:t>
+            </a:r>
+            <a:r>
+              <a:rPr lang="bg-BG" dirty="0"/>
+              <a:t> </a:t>
+            </a:r>
+            <a:r>
+              <a:rPr lang="en-US" dirty="0"/>
+              <a:t>adjustments applied to an existing string do not change it but return a new</a:t>
+            </a:r>
+            <a:r>
+              <a:rPr lang="bg-BG" dirty="0"/>
+              <a:t> </a:t>
+            </a:r>
+            <a:r>
+              <a:rPr lang="en-US" dirty="0"/>
+              <a:t>string. </a:t>
+            </a:r>
+            <a:endParaRPr lang="bg-BG" dirty="0"/>
+          </a:p>
+          <a:p>
+            <a:r>
+              <a:rPr lang="en-US" dirty="0"/>
+              <a:t>For example, using methods like Replace(…), </a:t>
+            </a:r>
+            <a:r>
+              <a:rPr lang="en-US" dirty="0" err="1"/>
+              <a:t>ToUpper</a:t>
+            </a:r>
+            <a:r>
+              <a:rPr lang="en-US" dirty="0"/>
+              <a:t>(…), Trim(…) do</a:t>
+            </a:r>
+            <a:r>
+              <a:rPr lang="bg-BG" dirty="0"/>
+              <a:t> </a:t>
+            </a:r>
+            <a:r>
+              <a:rPr lang="en-US" dirty="0"/>
+              <a:t>not change the string, which they are called for. They allocate a new area in</a:t>
+            </a:r>
+            <a:r>
+              <a:rPr lang="bg-BG" dirty="0"/>
+              <a:t> </a:t>
+            </a:r>
+            <a:r>
+              <a:rPr lang="en-US" dirty="0"/>
+              <a:t>the memory where the new content is saved. </a:t>
+            </a:r>
+            <a:endParaRPr lang="bg-BG" dirty="0"/>
+          </a:p>
+          <a:p>
+            <a:r>
+              <a:rPr lang="en-US" dirty="0"/>
+              <a:t>This behavior has many</a:t>
+            </a:r>
+            <a:r>
+              <a:rPr lang="bg-BG" dirty="0"/>
+              <a:t> </a:t>
+            </a:r>
+            <a:r>
+              <a:rPr lang="en-US" dirty="0"/>
+              <a:t>advantages but in some cases can cause performance problems.</a:t>
+            </a:r>
+            <a:endParaRPr lang="bg-BG" dirty="0"/>
+          </a:p>
+        </p:txBody>
+      </p:sp>
+    </p:spTree>
+    <p:extLst>
+      <p:ext uri="{BB962C8B-B14F-4D97-AF65-F5344CB8AC3E}">
+        <p14:creationId xmlns:p14="http://schemas.microsoft.com/office/powerpoint/2010/main" val="2877509815"/>
+      </p:ext>
+    </p:extLst>
+  </p:cSld>
+  <p:clrMapOvr>
+    <a:masterClrMapping/>
+  </p:clrMapOvr>
+</p:sld>
+</file>
+
+<file path=ppt/slides/slide38.xml><?xml version="1.0" encoding="utf-8"?>
+<p:sld xmlns:a="http://schemas.openxmlformats.org/drawingml/2006/main" xmlns:r="http://schemas.openxmlformats.org/officeDocument/2006/relationships" xmlns:p="http://schemas.openxmlformats.org/presentationml/2006/main">
+  <p:cSld>
+    <p:spTree>
+      <p:nvGrpSpPr>
+        <p:cNvPr id="1" name=""/>
+        <p:cNvGrpSpPr/>
+        <p:nvPr/>
+      </p:nvGrpSpPr>
+      <p:grpSpPr>
+        <a:xfrm>
+          <a:off x="0" y="0"/>
+          <a:ext cx="0" cy="0"/>
+          <a:chOff x="0" y="0"/>
+          <a:chExt cx="0" cy="0"/>
+        </a:xfrm>
+      </p:grpSpPr>
+      <p:sp>
+        <p:nvSpPr>
+          <p:cNvPr id="2" name="Title 1">
+            <a:extLst>
+              <a:ext uri="{FF2B5EF4-FFF2-40B4-BE49-F238E27FC236}">
+                <a16:creationId xmlns:a16="http://schemas.microsoft.com/office/drawing/2014/main" id="{08D52FC5-2D86-4D00-82A3-05113A97BB29}"/>
+              </a:ext>
+            </a:extLst>
+          </p:cNvPr>
+          <p:cNvSpPr>
+            <a:spLocks noGrp="1"/>
+          </p:cNvSpPr>
+          <p:nvPr>
+            <p:ph type="title"/>
+          </p:nvPr>
+        </p:nvSpPr>
+        <p:spPr/>
+        <p:txBody>
+          <a:bodyPr/>
+          <a:lstStyle/>
+          <a:p>
+            <a:r>
+              <a:rPr lang="en-US" dirty="0"/>
+              <a:t>Strings Concatenation</a:t>
+            </a:r>
+            <a:endParaRPr lang="bg-BG" dirty="0"/>
+          </a:p>
+        </p:txBody>
+      </p:sp>
+      <p:sp>
+        <p:nvSpPr>
+          <p:cNvPr id="3" name="Text Placeholder 2">
+            <a:extLst>
+              <a:ext uri="{FF2B5EF4-FFF2-40B4-BE49-F238E27FC236}">
+                <a16:creationId xmlns:a16="http://schemas.microsoft.com/office/drawing/2014/main" id="{B35A78F6-EFD2-46ED-9EFE-B6AC5875EC24}"/>
+              </a:ext>
+            </a:extLst>
+          </p:cNvPr>
+          <p:cNvSpPr>
+            <a:spLocks noGrp="1"/>
+          </p:cNvSpPr>
+          <p:nvPr>
+            <p:ph type="body" idx="1"/>
+          </p:nvPr>
+        </p:nvSpPr>
+        <p:spPr>
+          <a:xfrm>
+            <a:off x="1524000" y="1828800"/>
+            <a:ext cx="9144000" cy="2866417"/>
+          </a:xfrm>
+        </p:spPr>
+        <p:txBody>
+          <a:bodyPr/>
+          <a:lstStyle/>
+          <a:p>
+            <a:r>
+              <a:rPr lang="en-US" dirty="0"/>
+              <a:t>Serious performance problems may be encountered when trying to</a:t>
+            </a:r>
+            <a:r>
+              <a:rPr lang="bg-BG" dirty="0"/>
+              <a:t> </a:t>
+            </a:r>
+            <a:r>
+              <a:rPr lang="en-US" dirty="0"/>
+              <a:t>concatenate strings in a loop. </a:t>
+            </a:r>
+            <a:endParaRPr lang="bg-BG" dirty="0"/>
+          </a:p>
+          <a:p>
+            <a:r>
+              <a:rPr lang="en-US" dirty="0"/>
+              <a:t>The problem is directly related to the strings</a:t>
+            </a:r>
+            <a:r>
+              <a:rPr lang="bg-BG" dirty="0"/>
+              <a:t> </a:t>
+            </a:r>
+            <a:r>
+              <a:rPr lang="en-US" dirty="0"/>
+              <a:t>handling and dynamic memory, which is used to store them. </a:t>
+            </a:r>
+            <a:endParaRPr lang="bg-BG" dirty="0"/>
+          </a:p>
+          <a:p>
+            <a:r>
+              <a:rPr lang="en-US" dirty="0"/>
+              <a:t>To understand</a:t>
+            </a:r>
+            <a:r>
+              <a:rPr lang="bg-BG" dirty="0"/>
+              <a:t> </a:t>
+            </a:r>
+            <a:r>
+              <a:rPr lang="en-US" dirty="0"/>
+              <a:t>why we have poor performance when concatenating strings in a loop,</a:t>
+            </a:r>
+            <a:r>
+              <a:rPr lang="bg-BG" dirty="0"/>
+              <a:t> </a:t>
+            </a:r>
+            <a:r>
+              <a:rPr lang="en-US" dirty="0"/>
+              <a:t>we must first consider what happens when using operator "+" for strings.</a:t>
+            </a:r>
+            <a:endParaRPr lang="bg-BG" dirty="0"/>
+          </a:p>
+        </p:txBody>
+      </p:sp>
+      <p:pic>
+        <p:nvPicPr>
+          <p:cNvPr id="5" name="Picture 4">
+            <a:extLst>
+              <a:ext uri="{FF2B5EF4-FFF2-40B4-BE49-F238E27FC236}">
+                <a16:creationId xmlns:a16="http://schemas.microsoft.com/office/drawing/2014/main" id="{06B1D721-C500-4C99-ACF0-834DC5811527}"/>
+              </a:ext>
+            </a:extLst>
+          </p:cNvPr>
+          <p:cNvPicPr>
+            <a:picLocks noChangeAspect="1"/>
+          </p:cNvPicPr>
+          <p:nvPr/>
+        </p:nvPicPr>
+        <p:blipFill>
+          <a:blip r:embed="rId2"/>
+          <a:stretch>
+            <a:fillRect/>
+          </a:stretch>
+        </p:blipFill>
+        <p:spPr>
+          <a:xfrm>
+            <a:off x="2122049" y="4842956"/>
+            <a:ext cx="6534150" cy="933450"/>
+          </a:xfrm>
+          <a:prstGeom prst="rect">
+            <a:avLst/>
+          </a:prstGeom>
+        </p:spPr>
+      </p:pic>
+    </p:spTree>
+    <p:extLst>
+      <p:ext uri="{BB962C8B-B14F-4D97-AF65-F5344CB8AC3E}">
+        <p14:creationId xmlns:p14="http://schemas.microsoft.com/office/powerpoint/2010/main" val="1371865184"/>
+      </p:ext>
+    </p:extLst>
+  </p:cSld>
+  <p:clrMapOvr>
+    <a:masterClrMapping/>
+  </p:clrMapOvr>
+</p:sld>
+</file>
+
+<file path=ppt/slides/slide39.xml><?xml version="1.0" encoding="utf-8"?>
+<p:sld xmlns:a="http://schemas.openxmlformats.org/drawingml/2006/main" xmlns:r="http://schemas.openxmlformats.org/officeDocument/2006/relationships" xmlns:p="http://schemas.openxmlformats.org/presentationml/2006/main">
+  <p:cSld>
+    <p:spTree>
+      <p:nvGrpSpPr>
+        <p:cNvPr id="1" name=""/>
+        <p:cNvGrpSpPr/>
+        <p:nvPr/>
+      </p:nvGrpSpPr>
+      <p:grpSpPr>
+        <a:xfrm>
+          <a:off x="0" y="0"/>
+          <a:ext cx="0" cy="0"/>
+          <a:chOff x="0" y="0"/>
+          <a:chExt cx="0" cy="0"/>
+        </a:xfrm>
+      </p:grpSpPr>
+      <p:sp>
+        <p:nvSpPr>
+          <p:cNvPr id="2" name="Title 1">
+            <a:extLst>
+              <a:ext uri="{FF2B5EF4-FFF2-40B4-BE49-F238E27FC236}">
+                <a16:creationId xmlns:a16="http://schemas.microsoft.com/office/drawing/2014/main" id="{14CF1193-B8F4-4F61-B916-940AC8828600}"/>
+              </a:ext>
+            </a:extLst>
+          </p:cNvPr>
+          <p:cNvSpPr>
+            <a:spLocks noGrp="1"/>
+          </p:cNvSpPr>
+          <p:nvPr>
+            <p:ph type="title"/>
+          </p:nvPr>
+        </p:nvSpPr>
+        <p:spPr/>
+        <p:txBody>
+          <a:bodyPr/>
+          <a:lstStyle/>
+          <a:p>
+            <a:r>
+              <a:rPr lang="en-US" dirty="0"/>
+              <a:t>Strings Concatenation</a:t>
+            </a:r>
+            <a:endParaRPr lang="bg-BG" dirty="0"/>
+          </a:p>
+        </p:txBody>
+      </p:sp>
+      <p:sp>
+        <p:nvSpPr>
+          <p:cNvPr id="3" name="Text Placeholder 2">
+            <a:extLst>
+              <a:ext uri="{FF2B5EF4-FFF2-40B4-BE49-F238E27FC236}">
+                <a16:creationId xmlns:a16="http://schemas.microsoft.com/office/drawing/2014/main" id="{9B1D8289-C7E2-4230-8D25-559F372BCC66}"/>
+              </a:ext>
+            </a:extLst>
+          </p:cNvPr>
+          <p:cNvSpPr>
+            <a:spLocks noGrp="1"/>
+          </p:cNvSpPr>
+          <p:nvPr>
+            <p:ph type="body" idx="1"/>
+          </p:nvPr>
+        </p:nvSpPr>
+        <p:spPr>
+          <a:xfrm>
+            <a:off x="1524000" y="1536969"/>
+            <a:ext cx="10447506" cy="4714673"/>
+          </a:xfrm>
+        </p:spPr>
+        <p:txBody>
+          <a:bodyPr/>
+          <a:lstStyle/>
+          <a:p>
+            <a:r>
+              <a:rPr lang="en-US" sz="1800" dirty="0"/>
+              <a:t>What will happen with the memory? Creating the variable result will allocate</a:t>
+            </a:r>
+            <a:r>
+              <a:rPr lang="bg-BG" sz="1800" dirty="0"/>
+              <a:t> </a:t>
+            </a:r>
+            <a:r>
+              <a:rPr lang="en-US" sz="1800" dirty="0"/>
+              <a:t>a new area in dynamic memory, which will record the outcome of the str1 +</a:t>
+            </a:r>
+            <a:r>
+              <a:rPr lang="bg-BG" sz="1800" dirty="0"/>
+              <a:t> </a:t>
+            </a:r>
+            <a:r>
+              <a:rPr lang="en-US" sz="1800" dirty="0"/>
+              <a:t>str2, which is "</a:t>
+            </a:r>
+            <a:r>
+              <a:rPr lang="en-US" sz="1800" dirty="0" err="1"/>
+              <a:t>SuperStar</a:t>
+            </a:r>
+            <a:r>
+              <a:rPr lang="en-US" sz="1800" dirty="0"/>
+              <a:t>". Then the variable itself will keep the address of</a:t>
+            </a:r>
+            <a:r>
+              <a:rPr lang="bg-BG" sz="1800" dirty="0"/>
+              <a:t> </a:t>
+            </a:r>
+            <a:r>
+              <a:rPr lang="en-US" sz="1800" dirty="0"/>
+              <a:t>the allocated area. As a result we will have </a:t>
+            </a:r>
+            <a:r>
+              <a:rPr lang="en-US" sz="1800" i="1" u="sng" dirty="0"/>
+              <a:t>three areas in memory and three</a:t>
+            </a:r>
+            <a:r>
+              <a:rPr lang="bg-BG" sz="1800" i="1" u="sng" dirty="0"/>
+              <a:t> </a:t>
+            </a:r>
+            <a:r>
+              <a:rPr lang="en-US" sz="1800" i="1" u="sng" dirty="0"/>
+              <a:t>references</a:t>
+            </a:r>
+            <a:r>
+              <a:rPr lang="en-US" sz="1800" dirty="0"/>
+              <a:t> to them. This is convenient, but allocating a new area, recording a</a:t>
+            </a:r>
+            <a:r>
+              <a:rPr lang="bg-BG" sz="1800" dirty="0"/>
+              <a:t> </a:t>
+            </a:r>
+            <a:r>
+              <a:rPr lang="en-US" sz="1800" dirty="0"/>
+              <a:t>value, creating a new variable and referencing it in the memory is time</a:t>
+            </a:r>
+            <a:r>
+              <a:rPr lang="bg-BG" sz="1800" dirty="0"/>
+              <a:t> </a:t>
+            </a:r>
+            <a:r>
+              <a:rPr lang="en-US" sz="1800" dirty="0"/>
+              <a:t>consuming process that would be a problem when repeated many times,</a:t>
+            </a:r>
+            <a:r>
+              <a:rPr lang="bg-BG" sz="1800" dirty="0"/>
+              <a:t> </a:t>
+            </a:r>
+            <a:r>
+              <a:rPr lang="en-US" sz="1800" dirty="0"/>
+              <a:t>typically inside a loop.</a:t>
+            </a:r>
+          </a:p>
+          <a:p>
+            <a:r>
+              <a:rPr lang="en-US" sz="1800" dirty="0"/>
+              <a:t>Unlike other programming languages, in C# is not necessary to manually</a:t>
+            </a:r>
+            <a:r>
+              <a:rPr lang="bg-BG" sz="1800" dirty="0"/>
+              <a:t> </a:t>
+            </a:r>
+            <a:r>
+              <a:rPr lang="en-US" sz="1800" dirty="0"/>
+              <a:t>dispose the objects stored in memory. There is a special mechanism called a</a:t>
+            </a:r>
+            <a:r>
+              <a:rPr lang="bg-BG" sz="1800" dirty="0"/>
+              <a:t> </a:t>
+            </a:r>
+            <a:r>
+              <a:rPr lang="en-US" sz="1800" b="1" u="sng" dirty="0"/>
+              <a:t>garbage collector (memory cleaning system)</a:t>
+            </a:r>
+            <a:r>
+              <a:rPr lang="en-US" sz="1800" dirty="0"/>
+              <a:t>, which takes care of</a:t>
+            </a:r>
+            <a:r>
+              <a:rPr lang="bg-BG" sz="1800" dirty="0"/>
+              <a:t> </a:t>
+            </a:r>
+            <a:r>
+              <a:rPr lang="en-US" sz="1800" dirty="0"/>
+              <a:t>clearing the unused memory and resources. The garbage collector is</a:t>
+            </a:r>
+            <a:r>
+              <a:rPr lang="bg-BG" sz="1800" dirty="0"/>
+              <a:t> </a:t>
+            </a:r>
+            <a:r>
+              <a:rPr lang="en-US" sz="1800" dirty="0"/>
+              <a:t>responsible for disposing of objects in dynamic memory when they are no</a:t>
+            </a:r>
+            <a:r>
+              <a:rPr lang="bg-BG" sz="1800" dirty="0"/>
+              <a:t> </a:t>
+            </a:r>
+            <a:r>
+              <a:rPr lang="en-US" sz="1800" dirty="0"/>
+              <a:t>longer used. Creation of many objects containing multiple references in</a:t>
+            </a:r>
+            <a:r>
+              <a:rPr lang="bg-BG" sz="1800" dirty="0"/>
+              <a:t> </a:t>
+            </a:r>
+            <a:r>
+              <a:rPr lang="en-US" sz="1800" dirty="0"/>
+              <a:t>dynamic memory is bad, because it fills memory and then the garbage</a:t>
+            </a:r>
+            <a:r>
+              <a:rPr lang="bg-BG" sz="1800" dirty="0"/>
+              <a:t> </a:t>
+            </a:r>
+            <a:r>
+              <a:rPr lang="en-US" sz="1800" dirty="0"/>
+              <a:t>collector is automatically enforced to start execution. It takes quite some time</a:t>
+            </a:r>
+            <a:r>
+              <a:rPr lang="bg-BG" sz="1800" dirty="0"/>
+              <a:t> </a:t>
+            </a:r>
+            <a:r>
+              <a:rPr lang="en-US" sz="1800" dirty="0"/>
+              <a:t>and </a:t>
+            </a:r>
+            <a:r>
+              <a:rPr lang="en-US" sz="1800" b="1" u="sng" dirty="0"/>
+              <a:t>slows the overall performance of the process</a:t>
+            </a:r>
+            <a:r>
+              <a:rPr lang="en-US" sz="1800" dirty="0"/>
+              <a:t>. </a:t>
+            </a:r>
+            <a:endParaRPr lang="bg-BG" sz="1800" dirty="0"/>
+          </a:p>
+          <a:p>
+            <a:r>
+              <a:rPr lang="en-US" sz="1800" dirty="0"/>
+              <a:t>Furthermore,</a:t>
+            </a:r>
+            <a:r>
+              <a:rPr lang="bg-BG" sz="1800" dirty="0"/>
+              <a:t> </a:t>
+            </a:r>
+            <a:r>
+              <a:rPr lang="en-US" sz="1800" dirty="0"/>
+              <a:t>transferring characters from one place to another in memory (when string</a:t>
+            </a:r>
+            <a:r>
+              <a:rPr lang="bg-BG" sz="1800" dirty="0"/>
+              <a:t> </a:t>
+            </a:r>
+            <a:r>
+              <a:rPr lang="en-US" sz="1800" dirty="0"/>
+              <a:t>concatenation is executed) is slow, especially if the strings are long.</a:t>
+            </a:r>
+            <a:endParaRPr lang="bg-BG" sz="1800" dirty="0"/>
+          </a:p>
+        </p:txBody>
+      </p:sp>
+    </p:spTree>
+    <p:extLst>
+      <p:ext uri="{BB962C8B-B14F-4D97-AF65-F5344CB8AC3E}">
+        <p14:creationId xmlns:p14="http://schemas.microsoft.com/office/powerpoint/2010/main" val="3691703758"/>
+      </p:ext>
+    </p:extLst>
+  </p:cSld>
+  <p:clrMapOvr>
+    <a:masterClrMapping/>
+  </p:clrMapOvr>
+</p:sld>
+</file>
+
+<file path=ppt/slides/slide4.xml><?xml version="1.0" encoding="utf-8"?>
+<p:sld xmlns:a="http://schemas.openxmlformats.org/drawingml/2006/main" xmlns:r="http://schemas.openxmlformats.org/officeDocument/2006/relationships" xmlns:p="http://schemas.openxmlformats.org/presentationml/2006/main">
+  <p:cSld>
+    <p:spTree>
+      <p:nvGrpSpPr>
+        <p:cNvPr id="1" name=""/>
+        <p:cNvGrpSpPr/>
+        <p:nvPr/>
+      </p:nvGrpSpPr>
+      <p:grpSpPr>
+        <a:xfrm>
+          <a:off x="0" y="0"/>
+          <a:ext cx="0" cy="0"/>
+          <a:chOff x="0" y="0"/>
+          <a:chExt cx="0" cy="0"/>
+        </a:xfrm>
+      </p:grpSpPr>
+      <p:sp>
+        <p:nvSpPr>
+          <p:cNvPr id="2" name="Title 1">
+            <a:extLst>
+              <a:ext uri="{FF2B5EF4-FFF2-40B4-BE49-F238E27FC236}">
+                <a16:creationId xmlns:a16="http://schemas.microsoft.com/office/drawing/2014/main" id="{DC86D56C-8239-4E58-AA9B-C1F99F8E7D2F}"/>
+              </a:ext>
+            </a:extLst>
+          </p:cNvPr>
+          <p:cNvSpPr>
+            <a:spLocks noGrp="1"/>
+          </p:cNvSpPr>
+          <p:nvPr>
+            <p:ph type="title"/>
+          </p:nvPr>
+        </p:nvSpPr>
+        <p:spPr/>
+        <p:txBody>
+          <a:bodyPr/>
+          <a:lstStyle/>
+          <a:p>
+            <a:r>
+              <a:rPr lang="en-US" dirty="0"/>
+              <a:t>Strings</a:t>
+            </a:r>
+            <a:endParaRPr lang="bg-BG" dirty="0"/>
+          </a:p>
+        </p:txBody>
+      </p:sp>
+      <p:sp>
+        <p:nvSpPr>
+          <p:cNvPr id="3" name="Text Placeholder 2">
+            <a:extLst>
+              <a:ext uri="{FF2B5EF4-FFF2-40B4-BE49-F238E27FC236}">
+                <a16:creationId xmlns:a16="http://schemas.microsoft.com/office/drawing/2014/main" id="{125C1829-07AE-47D2-9119-AE2991300683}"/>
+              </a:ext>
+            </a:extLst>
+          </p:cNvPr>
+          <p:cNvSpPr>
+            <a:spLocks noGrp="1"/>
+          </p:cNvSpPr>
+          <p:nvPr>
+            <p:ph type="body" idx="1"/>
+          </p:nvPr>
+        </p:nvSpPr>
+        <p:spPr/>
+        <p:txBody>
+          <a:bodyPr/>
+          <a:lstStyle/>
+          <a:p>
+            <a:r>
+              <a:rPr lang="en-US" dirty="0"/>
+              <a:t>In practice we often come to the text processing: reading text files, searching for keywords and replacing them in a paragraph, validating user input data, </a:t>
+            </a:r>
+            <a:r>
+              <a:rPr lang="en-US" dirty="0" err="1"/>
+              <a:t>etc</a:t>
+            </a:r>
+            <a:r>
+              <a:rPr lang="en-US" dirty="0"/>
+              <a:t>… </a:t>
+            </a:r>
+          </a:p>
+          <a:p>
+            <a:r>
+              <a:rPr lang="en-US" dirty="0"/>
+              <a:t>In such cases we can save the text content, which we will need in strings, and process them using the C# language.</a:t>
+            </a:r>
+            <a:endParaRPr lang="bg-BG" dirty="0"/>
+          </a:p>
+        </p:txBody>
+      </p:sp>
+    </p:spTree>
+    <p:extLst>
+      <p:ext uri="{BB962C8B-B14F-4D97-AF65-F5344CB8AC3E}">
+        <p14:creationId xmlns:p14="http://schemas.microsoft.com/office/powerpoint/2010/main" val="2644478045"/>
+      </p:ext>
+    </p:extLst>
+  </p:cSld>
+  <p:clrMapOvr>
+    <a:masterClrMapping/>
+  </p:clrMapOvr>
+</p:sld>
+</file>
+
+<file path=ppt/slides/slide40.xml><?xml version="1.0" encoding="utf-8"?>
+<p:sld xmlns:a="http://schemas.openxmlformats.org/drawingml/2006/main" xmlns:r="http://schemas.openxmlformats.org/officeDocument/2006/relationships" xmlns:p="http://schemas.openxmlformats.org/presentationml/2006/main">
+  <p:cSld>
+    <p:spTree>
+      <p:nvGrpSpPr>
+        <p:cNvPr id="1" name=""/>
+        <p:cNvGrpSpPr/>
+        <p:nvPr/>
+      </p:nvGrpSpPr>
+      <p:grpSpPr>
+        <a:xfrm>
+          <a:off x="0" y="0"/>
+          <a:ext cx="0" cy="0"/>
+          <a:chOff x="0" y="0"/>
+          <a:chExt cx="0" cy="0"/>
+        </a:xfrm>
+      </p:grpSpPr>
+      <p:sp>
+        <p:nvSpPr>
+          <p:cNvPr id="2" name="Title 1">
+            <a:extLst>
+              <a:ext uri="{FF2B5EF4-FFF2-40B4-BE49-F238E27FC236}">
+                <a16:creationId xmlns:a16="http://schemas.microsoft.com/office/drawing/2014/main" id="{A9246F30-69E1-4BBC-9942-EA29026CC975}"/>
+              </a:ext>
+            </a:extLst>
+          </p:cNvPr>
+          <p:cNvSpPr>
+            <a:spLocks noGrp="1"/>
+          </p:cNvSpPr>
+          <p:nvPr>
+            <p:ph type="title"/>
+          </p:nvPr>
+        </p:nvSpPr>
+        <p:spPr/>
+        <p:txBody>
+          <a:bodyPr/>
+          <a:lstStyle/>
+          <a:p>
+            <a:r>
+              <a:rPr lang="en-US" dirty="0"/>
+              <a:t>Concatenating Strings in a Loop</a:t>
+            </a:r>
+            <a:endParaRPr lang="bg-BG" dirty="0"/>
+          </a:p>
+        </p:txBody>
+      </p:sp>
+      <p:sp>
+        <p:nvSpPr>
+          <p:cNvPr id="3" name="Text Placeholder 2">
+            <a:extLst>
+              <a:ext uri="{FF2B5EF4-FFF2-40B4-BE49-F238E27FC236}">
+                <a16:creationId xmlns:a16="http://schemas.microsoft.com/office/drawing/2014/main" id="{0FFF87AF-6F90-4B09-9282-41B98C79FF17}"/>
+              </a:ext>
+            </a:extLst>
+          </p:cNvPr>
+          <p:cNvSpPr>
+            <a:spLocks noGrp="1"/>
+          </p:cNvSpPr>
+          <p:nvPr>
+            <p:ph type="body" idx="1"/>
+          </p:nvPr>
+        </p:nvSpPr>
+        <p:spPr>
+          <a:xfrm>
+            <a:off x="1524000" y="3429000"/>
+            <a:ext cx="9144000" cy="2666999"/>
+          </a:xfrm>
+        </p:spPr>
+        <p:txBody>
+          <a:bodyPr/>
+          <a:lstStyle/>
+          <a:p>
+            <a:r>
+              <a:rPr lang="en-US" dirty="0"/>
+              <a:t>Execution of the above code will loop 20,000 times and after each iteration</a:t>
+            </a:r>
+            <a:r>
+              <a:rPr lang="bg-BG" dirty="0"/>
+              <a:t> </a:t>
+            </a:r>
+            <a:r>
+              <a:rPr lang="en-US" dirty="0"/>
+              <a:t>will add the current index to the collector variable. collector’s value after</a:t>
+            </a:r>
+            <a:r>
+              <a:rPr lang="bg-BG" dirty="0"/>
+              <a:t> </a:t>
+            </a:r>
+            <a:r>
+              <a:rPr lang="en-US" dirty="0"/>
+              <a:t>implementation would be: "Numbers: 12345678910111213141516…" </a:t>
+            </a:r>
+            <a:endParaRPr lang="bg-BG" dirty="0"/>
+          </a:p>
+          <a:p>
+            <a:r>
+              <a:rPr lang="en-US" dirty="0"/>
+              <a:t>Example …</a:t>
+            </a:r>
+            <a:endParaRPr lang="bg-BG" dirty="0"/>
+          </a:p>
+        </p:txBody>
+      </p:sp>
+      <p:pic>
+        <p:nvPicPr>
+          <p:cNvPr id="5" name="Picture 4">
+            <a:extLst>
+              <a:ext uri="{FF2B5EF4-FFF2-40B4-BE49-F238E27FC236}">
+                <a16:creationId xmlns:a16="http://schemas.microsoft.com/office/drawing/2014/main" id="{1C4E4B2A-F4BC-490F-979D-A8B06E089978}"/>
+              </a:ext>
+            </a:extLst>
+          </p:cNvPr>
+          <p:cNvPicPr>
+            <a:picLocks noChangeAspect="1"/>
+          </p:cNvPicPr>
+          <p:nvPr/>
+        </p:nvPicPr>
+        <p:blipFill>
+          <a:blip r:embed="rId2"/>
+          <a:stretch>
+            <a:fillRect/>
+          </a:stretch>
+        </p:blipFill>
+        <p:spPr>
+          <a:xfrm>
+            <a:off x="1524000" y="1755335"/>
+            <a:ext cx="6543675" cy="1323975"/>
+          </a:xfrm>
+          <a:prstGeom prst="rect">
+            <a:avLst/>
+          </a:prstGeom>
+        </p:spPr>
+      </p:pic>
+    </p:spTree>
+    <p:extLst>
+      <p:ext uri="{BB962C8B-B14F-4D97-AF65-F5344CB8AC3E}">
+        <p14:creationId xmlns:p14="http://schemas.microsoft.com/office/powerpoint/2010/main" val="2108330107"/>
+      </p:ext>
+    </p:extLst>
+  </p:cSld>
+  <p:clrMapOvr>
+    <a:masterClrMapping/>
+  </p:clrMapOvr>
+</p:sld>
+</file>
+
+<file path=ppt/slides/slide41.xml><?xml version="1.0" encoding="utf-8"?>
+<p:sld xmlns:a="http://schemas.openxmlformats.org/drawingml/2006/main" xmlns:r="http://schemas.openxmlformats.org/officeDocument/2006/relationships" xmlns:p="http://schemas.openxmlformats.org/presentationml/2006/main">
+  <p:cSld>
+    <p:spTree>
+      <p:nvGrpSpPr>
+        <p:cNvPr id="1" name=""/>
+        <p:cNvGrpSpPr/>
+        <p:nvPr/>
+      </p:nvGrpSpPr>
+      <p:grpSpPr>
+        <a:xfrm>
+          <a:off x="0" y="0"/>
+          <a:ext cx="0" cy="0"/>
+          <a:chOff x="0" y="0"/>
+          <a:chExt cx="0" cy="0"/>
+        </a:xfrm>
+      </p:grpSpPr>
+      <p:sp>
+        <p:nvSpPr>
+          <p:cNvPr id="2" name="Title 1">
+            <a:extLst>
+              <a:ext uri="{FF2B5EF4-FFF2-40B4-BE49-F238E27FC236}">
+                <a16:creationId xmlns:a16="http://schemas.microsoft.com/office/drawing/2014/main" id="{E81E390B-5EC2-4AE1-96AA-15CCA2951237}"/>
+              </a:ext>
+            </a:extLst>
+          </p:cNvPr>
+          <p:cNvSpPr>
+            <a:spLocks noGrp="1"/>
+          </p:cNvSpPr>
+          <p:nvPr>
+            <p:ph type="title"/>
+          </p:nvPr>
+        </p:nvSpPr>
+        <p:spPr/>
+        <p:txBody>
+          <a:bodyPr/>
+          <a:lstStyle/>
+          <a:p>
+            <a:r>
+              <a:rPr lang="en-US" dirty="0"/>
+              <a:t>Building and Changing Strings with StringBuilder</a:t>
+            </a:r>
+            <a:endParaRPr lang="bg-BG" dirty="0"/>
+          </a:p>
+        </p:txBody>
+      </p:sp>
+      <p:sp>
+        <p:nvSpPr>
+          <p:cNvPr id="3" name="Text Placeholder 2">
+            <a:extLst>
+              <a:ext uri="{FF2B5EF4-FFF2-40B4-BE49-F238E27FC236}">
+                <a16:creationId xmlns:a16="http://schemas.microsoft.com/office/drawing/2014/main" id="{5811E820-0B81-470D-A4E5-B37FB6151FA9}"/>
+              </a:ext>
+            </a:extLst>
+          </p:cNvPr>
+          <p:cNvSpPr>
+            <a:spLocks noGrp="1"/>
+          </p:cNvSpPr>
+          <p:nvPr>
+            <p:ph type="body" idx="1"/>
+          </p:nvPr>
+        </p:nvSpPr>
+        <p:spPr/>
+        <p:txBody>
+          <a:bodyPr/>
+          <a:lstStyle/>
+          <a:p>
+            <a:r>
+              <a:rPr lang="en-US" dirty="0"/>
+              <a:t>StringBuilder is a class that serves to build and change strings. </a:t>
+            </a:r>
+          </a:p>
+          <a:p>
+            <a:r>
+              <a:rPr lang="en-US" dirty="0"/>
+              <a:t>It overcomes the performance problems that arise when concatenating strings of type string. </a:t>
+            </a:r>
+          </a:p>
+          <a:p>
+            <a:r>
+              <a:rPr lang="en-US" dirty="0"/>
+              <a:t>The class is built in the form of an array of characters and what we need to know about it is that the information in it can be freely changed. </a:t>
+            </a:r>
+          </a:p>
+          <a:p>
+            <a:r>
+              <a:rPr lang="en-US" dirty="0"/>
+              <a:t>Changes that are required in the variables of type StringBuilder, are carried out in the same area of memory (buffer), which saves time and resources. </a:t>
+            </a:r>
+          </a:p>
+          <a:p>
+            <a:r>
+              <a:rPr lang="en-US" dirty="0"/>
+              <a:t>Changing the content does not create a new object but simply changes the current.</a:t>
+            </a:r>
+            <a:endParaRPr lang="bg-BG" dirty="0"/>
+          </a:p>
+        </p:txBody>
+      </p:sp>
+    </p:spTree>
+    <p:extLst>
+      <p:ext uri="{BB962C8B-B14F-4D97-AF65-F5344CB8AC3E}">
+        <p14:creationId xmlns:p14="http://schemas.microsoft.com/office/powerpoint/2010/main" val="1973636814"/>
+      </p:ext>
+    </p:extLst>
+  </p:cSld>
+  <p:clrMapOvr>
+    <a:masterClrMapping/>
+  </p:clrMapOvr>
+</p:sld>
+</file>
+
+<file path=ppt/slides/slide42.xml><?xml version="1.0" encoding="utf-8"?>
+<p:sld xmlns:a="http://schemas.openxmlformats.org/drawingml/2006/main" xmlns:r="http://schemas.openxmlformats.org/officeDocument/2006/relationships" xmlns:p="http://schemas.openxmlformats.org/presentationml/2006/main">
+  <p:cSld>
+    <p:spTree>
+      <p:nvGrpSpPr>
+        <p:cNvPr id="1" name=""/>
+        <p:cNvGrpSpPr/>
+        <p:nvPr/>
+      </p:nvGrpSpPr>
+      <p:grpSpPr>
+        <a:xfrm>
+          <a:off x="0" y="0"/>
+          <a:ext cx="0" cy="0"/>
+          <a:chOff x="0" y="0"/>
+          <a:chExt cx="0" cy="0"/>
+        </a:xfrm>
+      </p:grpSpPr>
+      <p:sp>
+        <p:nvSpPr>
+          <p:cNvPr id="2" name="Title 1">
+            <a:extLst>
+              <a:ext uri="{FF2B5EF4-FFF2-40B4-BE49-F238E27FC236}">
+                <a16:creationId xmlns:a16="http://schemas.microsoft.com/office/drawing/2014/main" id="{5A412947-E7D3-4723-84A8-2280E7A89478}"/>
+              </a:ext>
+            </a:extLst>
+          </p:cNvPr>
+          <p:cNvSpPr>
+            <a:spLocks noGrp="1"/>
+          </p:cNvSpPr>
+          <p:nvPr>
+            <p:ph type="title"/>
+          </p:nvPr>
+        </p:nvSpPr>
+        <p:spPr>
+          <a:xfrm>
+            <a:off x="1523999" y="457200"/>
+            <a:ext cx="9617413" cy="1143000"/>
+          </a:xfrm>
+        </p:spPr>
+        <p:txBody>
+          <a:bodyPr/>
+          <a:lstStyle/>
+          <a:p>
+            <a:r>
+              <a:rPr lang="en-US" dirty="0"/>
+              <a:t>How Does the StringBuilder Class Work?</a:t>
+            </a:r>
+            <a:endParaRPr lang="bg-BG" dirty="0"/>
+          </a:p>
+        </p:txBody>
+      </p:sp>
+      <p:sp>
+        <p:nvSpPr>
+          <p:cNvPr id="3" name="Text Placeholder 2">
+            <a:extLst>
+              <a:ext uri="{FF2B5EF4-FFF2-40B4-BE49-F238E27FC236}">
+                <a16:creationId xmlns:a16="http://schemas.microsoft.com/office/drawing/2014/main" id="{1CE52FC9-19B6-4835-AAD3-62824C2745DF}"/>
+              </a:ext>
+            </a:extLst>
+          </p:cNvPr>
+          <p:cNvSpPr>
+            <a:spLocks noGrp="1"/>
+          </p:cNvSpPr>
+          <p:nvPr>
+            <p:ph type="body" idx="1"/>
+          </p:nvPr>
+        </p:nvSpPr>
+        <p:spPr>
+          <a:xfrm>
+            <a:off x="1523999" y="1828800"/>
+            <a:ext cx="9961123" cy="4267200"/>
+          </a:xfrm>
+        </p:spPr>
+        <p:txBody>
+          <a:bodyPr/>
+          <a:lstStyle/>
+          <a:p>
+            <a:r>
+              <a:rPr lang="en-US" dirty="0"/>
+              <a:t>StringBuilder keeps a buffer with a certain capacity (16 characters by default). The buffer is implemented as an array of characters that is provided to the developer by a user-friendly interface – methods that quickly and easily add and edit elements of the string. At any moment part of the characters in the buffer are used and the rest stay in reserve. This allows the addition to work very quickly. Other operations also operate faster than the class string, because the changes do not create a new object.</a:t>
+            </a:r>
+          </a:p>
+          <a:p>
+            <a:r>
+              <a:rPr lang="en-US" dirty="0"/>
+              <a:t>Once the internal buffer of the StringBuilder is full, it automatically is doubled (the internal buffer is resized to increase its capacity while its content is kept unchanged). Resizing is a slow operation but is happens rarely so the total performance is good. </a:t>
+            </a:r>
+            <a:endParaRPr lang="bg-BG" dirty="0"/>
+          </a:p>
+        </p:txBody>
+      </p:sp>
+    </p:spTree>
+    <p:extLst>
+      <p:ext uri="{BB962C8B-B14F-4D97-AF65-F5344CB8AC3E}">
+        <p14:creationId xmlns:p14="http://schemas.microsoft.com/office/powerpoint/2010/main" val="4242666309"/>
+      </p:ext>
+    </p:extLst>
+  </p:cSld>
+  <p:clrMapOvr>
+    <a:masterClrMapping/>
+  </p:clrMapOvr>
+</p:sld>
+</file>
+
+<file path=ppt/slides/slide43.xml><?xml version="1.0" encoding="utf-8"?>
+<p:sld xmlns:a="http://schemas.openxmlformats.org/drawingml/2006/main" xmlns:r="http://schemas.openxmlformats.org/officeDocument/2006/relationships" xmlns:p="http://schemas.openxmlformats.org/presentationml/2006/main">
+  <p:cSld>
+    <p:spTree>
+      <p:nvGrpSpPr>
+        <p:cNvPr id="1" name=""/>
+        <p:cNvGrpSpPr/>
+        <p:nvPr/>
+      </p:nvGrpSpPr>
+      <p:grpSpPr>
+        <a:xfrm>
+          <a:off x="0" y="0"/>
+          <a:ext cx="0" cy="0"/>
+          <a:chOff x="0" y="0"/>
+          <a:chExt cx="0" cy="0"/>
+        </a:xfrm>
+      </p:grpSpPr>
+      <p:sp>
+        <p:nvSpPr>
+          <p:cNvPr id="2" name="Title 1">
+            <a:extLst>
+              <a:ext uri="{FF2B5EF4-FFF2-40B4-BE49-F238E27FC236}">
+                <a16:creationId xmlns:a16="http://schemas.microsoft.com/office/drawing/2014/main" id="{BB90F004-95C6-4EC8-87D1-9DA35EEBF8A9}"/>
+              </a:ext>
+            </a:extLst>
+          </p:cNvPr>
+          <p:cNvSpPr>
+            <a:spLocks noGrp="1"/>
+          </p:cNvSpPr>
+          <p:nvPr>
+            <p:ph type="title"/>
+          </p:nvPr>
+        </p:nvSpPr>
+        <p:spPr/>
+        <p:txBody>
+          <a:bodyPr/>
+          <a:lstStyle/>
+          <a:p>
+            <a:r>
+              <a:rPr lang="en-US" dirty="0"/>
+              <a:t>Processing Strings in the Memory</a:t>
+            </a:r>
+            <a:endParaRPr lang="bg-BG" dirty="0"/>
+          </a:p>
+        </p:txBody>
+      </p:sp>
+      <p:sp>
+        <p:nvSpPr>
+          <p:cNvPr id="3" name="Text Placeholder 2">
+            <a:extLst>
+              <a:ext uri="{FF2B5EF4-FFF2-40B4-BE49-F238E27FC236}">
+                <a16:creationId xmlns:a16="http://schemas.microsoft.com/office/drawing/2014/main" id="{18FA95AC-5C0C-42B2-89D9-F4EE55AD0824}"/>
+              </a:ext>
+            </a:extLst>
+          </p:cNvPr>
+          <p:cNvSpPr>
+            <a:spLocks noGrp="1"/>
+          </p:cNvSpPr>
+          <p:nvPr>
+            <p:ph type="body" idx="1"/>
+          </p:nvPr>
+        </p:nvSpPr>
+        <p:spPr>
+          <a:xfrm>
+            <a:off x="1523999" y="1828800"/>
+            <a:ext cx="10038945" cy="4267200"/>
+          </a:xfrm>
+        </p:spPr>
+        <p:txBody>
+          <a:bodyPr/>
+          <a:lstStyle/>
+          <a:p>
+            <a:pPr marL="101600" indent="0">
+              <a:buNone/>
+            </a:pPr>
+            <a:r>
+              <a:rPr lang="en-US" dirty="0"/>
+              <a:t>Several things happen at each step:</a:t>
+            </a:r>
+          </a:p>
+          <a:p>
+            <a:pPr marL="101600" indent="0">
+              <a:buNone/>
+            </a:pPr>
+            <a:r>
+              <a:rPr lang="en-US" dirty="0"/>
+              <a:t>1. An area of memory is allocated for recording the next number concatenation result. This memory is used only temporarily while concatenating, and is called a buffer.</a:t>
+            </a:r>
+          </a:p>
+          <a:p>
+            <a:pPr marL="101600" indent="0">
+              <a:buNone/>
+            </a:pPr>
+            <a:r>
+              <a:rPr lang="en-US" dirty="0"/>
+              <a:t>2. The old string is moved into the new buffer. If the string is long (say 500 KB, 5 MB or 50 MB), it can be quite slow!</a:t>
+            </a:r>
+          </a:p>
+          <a:p>
+            <a:pPr marL="101600" indent="0">
+              <a:buNone/>
+            </a:pPr>
+            <a:r>
+              <a:rPr lang="en-US" dirty="0"/>
+              <a:t>3. Next number is concatenated to the buffer.</a:t>
+            </a:r>
+          </a:p>
+          <a:p>
+            <a:pPr marL="101600" indent="0">
+              <a:buNone/>
+            </a:pPr>
+            <a:r>
+              <a:rPr lang="en-US" dirty="0"/>
+              <a:t>4. The buffer is converted to a string.</a:t>
+            </a:r>
+          </a:p>
+          <a:p>
+            <a:pPr marL="101600" indent="0">
+              <a:buNone/>
+            </a:pPr>
+            <a:r>
+              <a:rPr lang="en-US" dirty="0"/>
+              <a:t>5. The old string and the temporary buffer become unused. Later they are destroyed by the garbage collector. This may also be a slow operation.</a:t>
+            </a:r>
+            <a:endParaRPr lang="bg-BG" dirty="0"/>
+          </a:p>
+        </p:txBody>
+      </p:sp>
+    </p:spTree>
+    <p:extLst>
+      <p:ext uri="{BB962C8B-B14F-4D97-AF65-F5344CB8AC3E}">
+        <p14:creationId xmlns:p14="http://schemas.microsoft.com/office/powerpoint/2010/main" val="3628904788"/>
+      </p:ext>
+    </p:extLst>
+  </p:cSld>
+  <p:clrMapOvr>
+    <a:masterClrMapping/>
+  </p:clrMapOvr>
+</p:sld>
+</file>
+
+<file path=ppt/slides/slide44.xml><?xml version="1.0" encoding="utf-8"?>
+<p:sld xmlns:a="http://schemas.openxmlformats.org/drawingml/2006/main" xmlns:r="http://schemas.openxmlformats.org/officeDocument/2006/relationships" xmlns:p="http://schemas.openxmlformats.org/presentationml/2006/main">
+  <p:cSld>
+    <p:spTree>
+      <p:nvGrpSpPr>
+        <p:cNvPr id="1" name=""/>
+        <p:cNvGrpSpPr/>
+        <p:nvPr/>
+      </p:nvGrpSpPr>
+      <p:grpSpPr>
+        <a:xfrm>
+          <a:off x="0" y="0"/>
+          <a:ext cx="0" cy="0"/>
+          <a:chOff x="0" y="0"/>
+          <a:chExt cx="0" cy="0"/>
+        </a:xfrm>
+      </p:grpSpPr>
+      <p:sp>
+        <p:nvSpPr>
+          <p:cNvPr id="2" name="Title 1">
+            <a:extLst>
+              <a:ext uri="{FF2B5EF4-FFF2-40B4-BE49-F238E27FC236}">
+                <a16:creationId xmlns:a16="http://schemas.microsoft.com/office/drawing/2014/main" id="{4610B772-FA1E-469E-834D-F9708FD2130C}"/>
+              </a:ext>
+            </a:extLst>
+          </p:cNvPr>
+          <p:cNvSpPr>
+            <a:spLocks noGrp="1"/>
+          </p:cNvSpPr>
+          <p:nvPr>
+            <p:ph type="title"/>
+          </p:nvPr>
+        </p:nvSpPr>
+        <p:spPr/>
+        <p:txBody>
+          <a:bodyPr/>
+          <a:lstStyle/>
+          <a:p>
+            <a:r>
+              <a:rPr lang="en-US" dirty="0"/>
+              <a:t>Sting builder</a:t>
+            </a:r>
+            <a:endParaRPr lang="bg-BG" dirty="0"/>
+          </a:p>
+        </p:txBody>
+      </p:sp>
+      <p:pic>
+        <p:nvPicPr>
+          <p:cNvPr id="5" name="Picture 4">
+            <a:extLst>
+              <a:ext uri="{FF2B5EF4-FFF2-40B4-BE49-F238E27FC236}">
+                <a16:creationId xmlns:a16="http://schemas.microsoft.com/office/drawing/2014/main" id="{BCA09516-FDE3-4531-A138-FED79E14D8F3}"/>
+              </a:ext>
+            </a:extLst>
+          </p:cNvPr>
+          <p:cNvPicPr>
+            <a:picLocks noChangeAspect="1"/>
+          </p:cNvPicPr>
+          <p:nvPr/>
+        </p:nvPicPr>
+        <p:blipFill>
+          <a:blip r:embed="rId2"/>
+          <a:stretch>
+            <a:fillRect/>
+          </a:stretch>
+        </p:blipFill>
+        <p:spPr>
+          <a:xfrm>
+            <a:off x="1524000" y="1828800"/>
+            <a:ext cx="6524625" cy="752475"/>
+          </a:xfrm>
+          <a:prstGeom prst="rect">
+            <a:avLst/>
+          </a:prstGeom>
+        </p:spPr>
+      </p:pic>
+      <p:pic>
+        <p:nvPicPr>
+          <p:cNvPr id="7" name="Picture 6">
+            <a:extLst>
+              <a:ext uri="{FF2B5EF4-FFF2-40B4-BE49-F238E27FC236}">
+                <a16:creationId xmlns:a16="http://schemas.microsoft.com/office/drawing/2014/main" id="{46BF93BA-CE57-43B5-87A5-6FA4FAB0B483}"/>
+              </a:ext>
+            </a:extLst>
+          </p:cNvPr>
+          <p:cNvPicPr>
+            <a:picLocks noChangeAspect="1"/>
+          </p:cNvPicPr>
+          <p:nvPr/>
+        </p:nvPicPr>
+        <p:blipFill>
+          <a:blip r:embed="rId3"/>
+          <a:stretch>
+            <a:fillRect/>
+          </a:stretch>
+        </p:blipFill>
+        <p:spPr>
+          <a:xfrm>
+            <a:off x="1524000" y="3161083"/>
+            <a:ext cx="6524624" cy="1915077"/>
+          </a:xfrm>
+          <a:prstGeom prst="rect">
+            <a:avLst/>
+          </a:prstGeom>
+        </p:spPr>
+      </p:pic>
+    </p:spTree>
+    <p:extLst>
+      <p:ext uri="{BB962C8B-B14F-4D97-AF65-F5344CB8AC3E}">
+        <p14:creationId xmlns:p14="http://schemas.microsoft.com/office/powerpoint/2010/main" val="1931261162"/>
+      </p:ext>
+    </p:extLst>
+  </p:cSld>
+  <p:clrMapOvr>
+    <a:masterClrMapping/>
+  </p:clrMapOvr>
+</p:sld>
+</file>
+
+<file path=ppt/slides/slide45.xml><?xml version="1.0" encoding="utf-8"?>
+<p:sld xmlns:a="http://schemas.openxmlformats.org/drawingml/2006/main" xmlns:r="http://schemas.openxmlformats.org/officeDocument/2006/relationships" xmlns:p="http://schemas.openxmlformats.org/presentationml/2006/main">
+  <p:cSld>
+    <p:spTree>
+      <p:nvGrpSpPr>
+        <p:cNvPr id="1" name=""/>
+        <p:cNvGrpSpPr/>
+        <p:nvPr/>
+      </p:nvGrpSpPr>
+      <p:grpSpPr>
+        <a:xfrm>
+          <a:off x="0" y="0"/>
+          <a:ext cx="0" cy="0"/>
+          <a:chOff x="0" y="0"/>
+          <a:chExt cx="0" cy="0"/>
+        </a:xfrm>
+      </p:grpSpPr>
+      <p:sp>
+        <p:nvSpPr>
+          <p:cNvPr id="2" name="Title 1">
+            <a:extLst>
+              <a:ext uri="{FF2B5EF4-FFF2-40B4-BE49-F238E27FC236}">
+                <a16:creationId xmlns:a16="http://schemas.microsoft.com/office/drawing/2014/main" id="{FEF2BA3D-5536-4731-8621-713316230D48}"/>
+              </a:ext>
+            </a:extLst>
+          </p:cNvPr>
+          <p:cNvSpPr>
+            <a:spLocks noGrp="1"/>
+          </p:cNvSpPr>
+          <p:nvPr>
+            <p:ph type="title"/>
+          </p:nvPr>
+        </p:nvSpPr>
+        <p:spPr/>
+        <p:txBody>
+          <a:bodyPr/>
+          <a:lstStyle/>
+          <a:p>
+            <a:r>
+              <a:rPr lang="en-US" dirty="0"/>
+              <a:t>StringBuilder – More Important Methods</a:t>
+            </a:r>
+            <a:endParaRPr lang="bg-BG" dirty="0"/>
+          </a:p>
+        </p:txBody>
+      </p:sp>
+      <p:sp>
+        <p:nvSpPr>
+          <p:cNvPr id="3" name="Text Placeholder 2">
+            <a:extLst>
+              <a:ext uri="{FF2B5EF4-FFF2-40B4-BE49-F238E27FC236}">
+                <a16:creationId xmlns:a16="http://schemas.microsoft.com/office/drawing/2014/main" id="{418558F1-D20D-4215-84DC-096816EAA7DE}"/>
+              </a:ext>
+            </a:extLst>
+          </p:cNvPr>
+          <p:cNvSpPr>
+            <a:spLocks noGrp="1"/>
+          </p:cNvSpPr>
+          <p:nvPr>
+            <p:ph type="body" idx="1"/>
+          </p:nvPr>
+        </p:nvSpPr>
+        <p:spPr>
+          <a:xfrm>
+            <a:off x="1154349" y="1543455"/>
+            <a:ext cx="10869038" cy="5123234"/>
+          </a:xfrm>
+        </p:spPr>
+        <p:txBody>
+          <a:bodyPr/>
+          <a:lstStyle/>
+          <a:p>
+            <a:r>
+              <a:rPr lang="en-US" sz="1600" dirty="0"/>
+              <a:t>StringBuilder(int capacity) – constructor with an initial capacity parameter. It may be used to set the buffer size in advance if we have estimates of the number of iterations and concatenations, which will be performed. This way we can save unnecessary dynamic memory allocations.</a:t>
+            </a:r>
+          </a:p>
+          <a:p>
+            <a:r>
+              <a:rPr lang="en-US" sz="1600" b="1" dirty="0"/>
+              <a:t>Capacity</a:t>
+            </a:r>
+            <a:r>
+              <a:rPr lang="en-US" sz="1600" dirty="0"/>
+              <a:t> – returns the buffer size (total number of used and unused positions in the buffer).</a:t>
+            </a:r>
+          </a:p>
+          <a:p>
+            <a:r>
+              <a:rPr lang="en-US" sz="1600" b="1" dirty="0"/>
+              <a:t>Length</a:t>
+            </a:r>
+            <a:r>
+              <a:rPr lang="en-US" sz="1600" dirty="0"/>
+              <a:t> – returns length of string saved in the variable (number of used positions in the buffer)</a:t>
+            </a:r>
+          </a:p>
+          <a:p>
+            <a:r>
+              <a:rPr lang="en-US" sz="1600" b="1" dirty="0"/>
+              <a:t>Indexer</a:t>
+            </a:r>
+            <a:r>
+              <a:rPr lang="en-US" sz="1600" dirty="0"/>
+              <a:t> [int index] – return the character stored in given position.</a:t>
+            </a:r>
+          </a:p>
+          <a:p>
+            <a:r>
+              <a:rPr lang="en-US" sz="1600" b="1" dirty="0"/>
+              <a:t>Append</a:t>
+            </a:r>
+            <a:r>
+              <a:rPr lang="en-US" sz="1600" dirty="0"/>
+              <a:t>(…) – appends string, number or other value after the last character in the buffer.</a:t>
+            </a:r>
+          </a:p>
+          <a:p>
+            <a:r>
+              <a:rPr lang="en-US" sz="1600" b="1" dirty="0"/>
+              <a:t>Clear</a:t>
+            </a:r>
+            <a:r>
+              <a:rPr lang="en-US" sz="1600" dirty="0"/>
+              <a:t>(…) – removes all characters from the buffer (deletes it).</a:t>
+            </a:r>
+          </a:p>
+          <a:p>
+            <a:r>
+              <a:rPr lang="en-US" sz="1600" b="1" dirty="0"/>
+              <a:t>Remove</a:t>
+            </a:r>
+            <a:r>
+              <a:rPr lang="en-US" sz="1600" dirty="0"/>
+              <a:t>(int </a:t>
+            </a:r>
+            <a:r>
+              <a:rPr lang="en-US" sz="1600" dirty="0" err="1"/>
+              <a:t>startIndex</a:t>
+            </a:r>
+            <a:r>
+              <a:rPr lang="en-US" sz="1600" dirty="0"/>
+              <a:t>, int length) – removes (deletes) string from the buffer with a given start position and length.</a:t>
+            </a:r>
+          </a:p>
+          <a:p>
+            <a:r>
+              <a:rPr lang="en-US" sz="1600" b="1" dirty="0"/>
+              <a:t>Insert</a:t>
+            </a:r>
+            <a:r>
+              <a:rPr lang="en-US" sz="1600" dirty="0"/>
+              <a:t>(int offset, string str) – inserts a string in a given start position (offset).</a:t>
+            </a:r>
+          </a:p>
+          <a:p>
+            <a:r>
+              <a:rPr lang="en-US" sz="1600" b="1" dirty="0"/>
+              <a:t>Replace</a:t>
+            </a:r>
+            <a:r>
+              <a:rPr lang="en-US" sz="1600" dirty="0"/>
+              <a:t>(string </a:t>
+            </a:r>
+            <a:r>
+              <a:rPr lang="en-US" sz="1600" dirty="0" err="1"/>
+              <a:t>oldValue</a:t>
+            </a:r>
+            <a:r>
+              <a:rPr lang="en-US" sz="1600" dirty="0"/>
+              <a:t>, string </a:t>
+            </a:r>
+            <a:r>
+              <a:rPr lang="en-US" sz="1600" dirty="0" err="1"/>
+              <a:t>newValue</a:t>
+            </a:r>
+            <a:r>
+              <a:rPr lang="en-US" sz="1600" dirty="0"/>
+              <a:t>) – replaces all occurrences of a given substring with  </a:t>
+            </a:r>
+            <a:r>
+              <a:rPr lang="en-US" sz="1600" dirty="0" err="1"/>
+              <a:t>nother</a:t>
+            </a:r>
+            <a:r>
+              <a:rPr lang="en-US" sz="1600" dirty="0"/>
+              <a:t> substring.</a:t>
+            </a:r>
+          </a:p>
+          <a:p>
+            <a:r>
+              <a:rPr lang="en-US" sz="1600" b="1" dirty="0" err="1"/>
+              <a:t>ToString</a:t>
+            </a:r>
+            <a:r>
+              <a:rPr lang="en-US" sz="1600" dirty="0"/>
+              <a:t>() – returns the StringBuilder object content as a string object.</a:t>
+            </a:r>
+            <a:endParaRPr lang="bg-BG" sz="1600" dirty="0"/>
+          </a:p>
+        </p:txBody>
+      </p:sp>
+    </p:spTree>
+    <p:extLst>
+      <p:ext uri="{BB962C8B-B14F-4D97-AF65-F5344CB8AC3E}">
+        <p14:creationId xmlns:p14="http://schemas.microsoft.com/office/powerpoint/2010/main" val="354226852"/>
+      </p:ext>
+    </p:extLst>
+  </p:cSld>
+  <p:clrMapOvr>
+    <a:masterClrMapping/>
+  </p:clrMapOvr>
+</p:sld>
+</file>
+
+<file path=ppt/slides/slide46.xml><?xml version="1.0" encoding="utf-8"?>
+<p:sld xmlns:a="http://schemas.openxmlformats.org/drawingml/2006/main" xmlns:r="http://schemas.openxmlformats.org/officeDocument/2006/relationships" xmlns:p="http://schemas.openxmlformats.org/presentationml/2006/main">
+  <p:cSld>
+    <p:spTree>
+      <p:nvGrpSpPr>
+        <p:cNvPr id="1" name=""/>
+        <p:cNvGrpSpPr/>
+        <p:nvPr/>
+      </p:nvGrpSpPr>
+      <p:grpSpPr>
+        <a:xfrm>
+          <a:off x="0" y="0"/>
+          <a:ext cx="0" cy="0"/>
+          <a:chOff x="0" y="0"/>
+          <a:chExt cx="0" cy="0"/>
+        </a:xfrm>
+      </p:grpSpPr>
+      <p:sp>
+        <p:nvSpPr>
+          <p:cNvPr id="2" name="Title 1">
+            <a:extLst>
+              <a:ext uri="{FF2B5EF4-FFF2-40B4-BE49-F238E27FC236}">
+                <a16:creationId xmlns:a16="http://schemas.microsoft.com/office/drawing/2014/main" id="{F3AB3524-8029-416C-A523-68D49FA750BA}"/>
+              </a:ext>
+            </a:extLst>
+          </p:cNvPr>
+          <p:cNvSpPr>
+            <a:spLocks noGrp="1"/>
+          </p:cNvSpPr>
+          <p:nvPr>
+            <p:ph type="title"/>
+          </p:nvPr>
+        </p:nvSpPr>
+        <p:spPr/>
+        <p:txBody>
+          <a:bodyPr/>
+          <a:lstStyle/>
+          <a:p>
+            <a:r>
+              <a:rPr lang="en-US" dirty="0"/>
+              <a:t>Extract all capital letters</a:t>
+            </a:r>
+            <a:endParaRPr lang="bg-BG" dirty="0"/>
+          </a:p>
+        </p:txBody>
+      </p:sp>
+      <p:sp>
+        <p:nvSpPr>
+          <p:cNvPr id="3" name="Text Placeholder 2">
+            <a:extLst>
+              <a:ext uri="{FF2B5EF4-FFF2-40B4-BE49-F238E27FC236}">
+                <a16:creationId xmlns:a16="http://schemas.microsoft.com/office/drawing/2014/main" id="{20C840CE-AE5E-44F7-8884-DDEA8D6CF70D}"/>
+              </a:ext>
+            </a:extLst>
+          </p:cNvPr>
+          <p:cNvSpPr>
+            <a:spLocks noGrp="1"/>
+          </p:cNvSpPr>
+          <p:nvPr>
+            <p:ph type="body" idx="1"/>
+          </p:nvPr>
+        </p:nvSpPr>
+        <p:spPr/>
+        <p:txBody>
+          <a:bodyPr/>
+          <a:lstStyle/>
+          <a:p>
+            <a:r>
+              <a:rPr lang="en-US" dirty="0"/>
+              <a:t>Example…</a:t>
+            </a:r>
+            <a:endParaRPr lang="bg-BG" dirty="0"/>
+          </a:p>
+        </p:txBody>
+      </p:sp>
+    </p:spTree>
+    <p:extLst>
+      <p:ext uri="{BB962C8B-B14F-4D97-AF65-F5344CB8AC3E}">
+        <p14:creationId xmlns:p14="http://schemas.microsoft.com/office/powerpoint/2010/main" val="2786457129"/>
+      </p:ext>
+    </p:extLst>
+  </p:cSld>
+  <p:clrMapOvr>
+    <a:masterClrMapping/>
+  </p:clrMapOvr>
+</p:sld>
+</file>
+
+<file path=ppt/slides/slide47.xml><?xml version="1.0" encoding="utf-8"?>
+<p:sld xmlns:a="http://schemas.openxmlformats.org/drawingml/2006/main" xmlns:r="http://schemas.openxmlformats.org/officeDocument/2006/relationships" xmlns:p="http://schemas.openxmlformats.org/presentationml/2006/main">
+  <p:cSld>
+    <p:spTree>
+      <p:nvGrpSpPr>
+        <p:cNvPr id="1" name=""/>
+        <p:cNvGrpSpPr/>
+        <p:nvPr/>
+      </p:nvGrpSpPr>
+      <p:grpSpPr>
+        <a:xfrm>
+          <a:off x="0" y="0"/>
+          <a:ext cx="0" cy="0"/>
+          <a:chOff x="0" y="0"/>
+          <a:chExt cx="0" cy="0"/>
+        </a:xfrm>
+      </p:grpSpPr>
+      <p:sp>
+        <p:nvSpPr>
+          <p:cNvPr id="2" name="Title 1">
+            <a:extLst>
+              <a:ext uri="{FF2B5EF4-FFF2-40B4-BE49-F238E27FC236}">
+                <a16:creationId xmlns:a16="http://schemas.microsoft.com/office/drawing/2014/main" id="{928E903F-F8AA-4E71-940B-A83EBB8BBB74}"/>
+              </a:ext>
+            </a:extLst>
+          </p:cNvPr>
+          <p:cNvSpPr>
+            <a:spLocks noGrp="1"/>
+          </p:cNvSpPr>
+          <p:nvPr>
+            <p:ph type="title"/>
+          </p:nvPr>
+        </p:nvSpPr>
+        <p:spPr/>
+        <p:txBody>
+          <a:bodyPr/>
+          <a:lstStyle/>
+          <a:p>
+            <a:r>
+              <a:rPr lang="en-US" dirty="0"/>
+              <a:t>String Formatting</a:t>
+            </a:r>
+            <a:br>
+              <a:rPr lang="en-US" dirty="0"/>
+            </a:br>
+            <a:r>
+              <a:rPr lang="en-US" dirty="0"/>
+              <a:t>The </a:t>
+            </a:r>
+            <a:r>
+              <a:rPr lang="en-US" dirty="0" err="1"/>
+              <a:t>ToString</a:t>
+            </a:r>
+            <a:r>
+              <a:rPr lang="en-US" dirty="0"/>
+              <a:t>(…) Method</a:t>
+            </a:r>
+            <a:endParaRPr lang="bg-BG" dirty="0"/>
+          </a:p>
+        </p:txBody>
+      </p:sp>
+      <p:sp>
+        <p:nvSpPr>
+          <p:cNvPr id="3" name="Text Placeholder 2">
+            <a:extLst>
+              <a:ext uri="{FF2B5EF4-FFF2-40B4-BE49-F238E27FC236}">
+                <a16:creationId xmlns:a16="http://schemas.microsoft.com/office/drawing/2014/main" id="{BE812DC2-C082-47B3-8141-8F0E3079CFF0}"/>
+              </a:ext>
+            </a:extLst>
+          </p:cNvPr>
+          <p:cNvSpPr>
+            <a:spLocks noGrp="1"/>
+          </p:cNvSpPr>
+          <p:nvPr>
+            <p:ph type="body" idx="1"/>
+          </p:nvPr>
+        </p:nvSpPr>
+        <p:spPr>
+          <a:xfrm>
+            <a:off x="1524000" y="1828800"/>
+            <a:ext cx="10025974" cy="4267200"/>
+          </a:xfrm>
+        </p:spPr>
+        <p:txBody>
+          <a:bodyPr/>
+          <a:lstStyle/>
+          <a:p>
+            <a:r>
+              <a:rPr lang="en-US" dirty="0"/>
+              <a:t>One of the interesting concepts in .NET is that practically every object of a class and primitive variables can be presented as text. This is done by the method </a:t>
+            </a:r>
+            <a:r>
+              <a:rPr lang="en-US" dirty="0" err="1"/>
+              <a:t>ToString</a:t>
+            </a:r>
+            <a:r>
+              <a:rPr lang="en-US" dirty="0"/>
+              <a:t>(…), which is present in all .NET objects. It is implicit in the definition of the object class – the base class that all .NET data types inherit directly or indirectly. Thus the definition of the method appears in each class and we can use it to bring the content of each object in some text form.</a:t>
+            </a:r>
+          </a:p>
+          <a:p>
+            <a:r>
+              <a:rPr lang="en-US" dirty="0"/>
+              <a:t>The method </a:t>
+            </a:r>
+            <a:r>
+              <a:rPr lang="en-US" dirty="0" err="1"/>
+              <a:t>ToString</a:t>
+            </a:r>
+            <a:r>
+              <a:rPr lang="en-US" dirty="0"/>
+              <a:t>(…) is called automatically when we print objects from different classes to the console. For example, when printing dates the submitted date is converted to text by calling the </a:t>
+            </a:r>
+            <a:r>
+              <a:rPr lang="en-US" dirty="0" err="1"/>
+              <a:t>ToString</a:t>
+            </a:r>
+            <a:r>
+              <a:rPr lang="en-US" dirty="0"/>
+              <a:t>(…):</a:t>
+            </a:r>
+            <a:endParaRPr lang="bg-BG" dirty="0"/>
+          </a:p>
+        </p:txBody>
+      </p:sp>
+      <p:pic>
+        <p:nvPicPr>
+          <p:cNvPr id="5" name="Picture 4">
+            <a:extLst>
+              <a:ext uri="{FF2B5EF4-FFF2-40B4-BE49-F238E27FC236}">
+                <a16:creationId xmlns:a16="http://schemas.microsoft.com/office/drawing/2014/main" id="{E7FCE11C-581B-4BE9-874A-B8142519487E}"/>
+              </a:ext>
+            </a:extLst>
+          </p:cNvPr>
+          <p:cNvPicPr>
+            <a:picLocks noChangeAspect="1"/>
+          </p:cNvPicPr>
+          <p:nvPr/>
+        </p:nvPicPr>
+        <p:blipFill>
+          <a:blip r:embed="rId2"/>
+          <a:stretch>
+            <a:fillRect/>
+          </a:stretch>
+        </p:blipFill>
+        <p:spPr>
+          <a:xfrm>
+            <a:off x="2098235" y="5106413"/>
+            <a:ext cx="6581775" cy="962025"/>
+          </a:xfrm>
+          <a:prstGeom prst="rect">
+            <a:avLst/>
+          </a:prstGeom>
+        </p:spPr>
+      </p:pic>
+    </p:spTree>
+    <p:extLst>
+      <p:ext uri="{BB962C8B-B14F-4D97-AF65-F5344CB8AC3E}">
+        <p14:creationId xmlns:p14="http://schemas.microsoft.com/office/powerpoint/2010/main" val="882604012"/>
+      </p:ext>
+    </p:extLst>
+  </p:cSld>
+  <p:clrMapOvr>
+    <a:masterClrMapping/>
+  </p:clrMapOvr>
+</p:sld>
+</file>
+
+<file path=ppt/slides/slide48.xml><?xml version="1.0" encoding="utf-8"?>
+<p:sld xmlns:a="http://schemas.openxmlformats.org/drawingml/2006/main" xmlns:r="http://schemas.openxmlformats.org/officeDocument/2006/relationships" xmlns:p="http://schemas.openxmlformats.org/presentationml/2006/main">
+  <p:cSld>
+    <p:spTree>
+      <p:nvGrpSpPr>
+        <p:cNvPr id="1" name=""/>
+        <p:cNvGrpSpPr/>
+        <p:nvPr/>
+      </p:nvGrpSpPr>
+      <p:grpSpPr>
+        <a:xfrm>
+          <a:off x="0" y="0"/>
+          <a:ext cx="0" cy="0"/>
+          <a:chOff x="0" y="0"/>
+          <a:chExt cx="0" cy="0"/>
+        </a:xfrm>
+      </p:grpSpPr>
+      <p:sp>
+        <p:nvSpPr>
+          <p:cNvPr id="2" name="Title 1">
+            <a:extLst>
+              <a:ext uri="{FF2B5EF4-FFF2-40B4-BE49-F238E27FC236}">
+                <a16:creationId xmlns:a16="http://schemas.microsoft.com/office/drawing/2014/main" id="{73C211C6-41B7-4600-B883-FC25BD10C766}"/>
+              </a:ext>
+            </a:extLst>
+          </p:cNvPr>
+          <p:cNvSpPr>
+            <a:spLocks noGrp="1"/>
+          </p:cNvSpPr>
+          <p:nvPr>
+            <p:ph type="title"/>
+          </p:nvPr>
+        </p:nvSpPr>
+        <p:spPr/>
+        <p:txBody>
+          <a:bodyPr/>
+          <a:lstStyle/>
+          <a:p>
+            <a:r>
+              <a:rPr lang="en-US" dirty="0"/>
+              <a:t>Using of </a:t>
+            </a:r>
+            <a:r>
+              <a:rPr lang="en-US" dirty="0" err="1"/>
+              <a:t>String.Format</a:t>
+            </a:r>
+            <a:r>
+              <a:rPr lang="en-US" dirty="0"/>
+              <a:t>(…)</a:t>
+            </a:r>
+            <a:endParaRPr lang="bg-BG" dirty="0"/>
+          </a:p>
+        </p:txBody>
+      </p:sp>
+      <p:pic>
+        <p:nvPicPr>
+          <p:cNvPr id="5" name="Picture 4">
+            <a:extLst>
+              <a:ext uri="{FF2B5EF4-FFF2-40B4-BE49-F238E27FC236}">
+                <a16:creationId xmlns:a16="http://schemas.microsoft.com/office/drawing/2014/main" id="{A12D6A21-CF8E-4A68-B3DD-DD2662C250EB}"/>
+              </a:ext>
+            </a:extLst>
+          </p:cNvPr>
+          <p:cNvPicPr>
+            <a:picLocks noChangeAspect="1"/>
+          </p:cNvPicPr>
+          <p:nvPr/>
+        </p:nvPicPr>
+        <p:blipFill>
+          <a:blip r:embed="rId2"/>
+          <a:stretch>
+            <a:fillRect/>
+          </a:stretch>
+        </p:blipFill>
+        <p:spPr>
+          <a:xfrm>
+            <a:off x="1523999" y="1828800"/>
+            <a:ext cx="8841449" cy="3800272"/>
+          </a:xfrm>
+          <a:prstGeom prst="rect">
+            <a:avLst/>
+          </a:prstGeom>
+        </p:spPr>
+      </p:pic>
+    </p:spTree>
+    <p:extLst>
+      <p:ext uri="{BB962C8B-B14F-4D97-AF65-F5344CB8AC3E}">
+        <p14:creationId xmlns:p14="http://schemas.microsoft.com/office/powerpoint/2010/main" val="690937536"/>
+      </p:ext>
+    </p:extLst>
+  </p:cSld>
+  <p:clrMapOvr>
+    <a:masterClrMapping/>
+  </p:clrMapOvr>
+</p:sld>
+</file>
+
+<file path=ppt/slides/slide49.xml><?xml version="1.0" encoding="utf-8"?>
+<p:sld xmlns:a="http://schemas.openxmlformats.org/drawingml/2006/main" xmlns:r="http://schemas.openxmlformats.org/officeDocument/2006/relationships" xmlns:p="http://schemas.openxmlformats.org/presentationml/2006/main">
+  <p:cSld>
+    <p:spTree>
+      <p:nvGrpSpPr>
+        <p:cNvPr id="1" name=""/>
+        <p:cNvGrpSpPr/>
+        <p:nvPr/>
+      </p:nvGrpSpPr>
+      <p:grpSpPr>
+        <a:xfrm>
+          <a:off x="0" y="0"/>
+          <a:ext cx="0" cy="0"/>
+          <a:chOff x="0" y="0"/>
+          <a:chExt cx="0" cy="0"/>
+        </a:xfrm>
+      </p:grpSpPr>
+      <p:sp>
+        <p:nvSpPr>
+          <p:cNvPr id="2" name="Title 1">
+            <a:extLst>
+              <a:ext uri="{FF2B5EF4-FFF2-40B4-BE49-F238E27FC236}">
+                <a16:creationId xmlns:a16="http://schemas.microsoft.com/office/drawing/2014/main" id="{928A1E29-0461-4ADE-A8AE-082893C47264}"/>
+              </a:ext>
+            </a:extLst>
+          </p:cNvPr>
+          <p:cNvSpPr>
+            <a:spLocks noGrp="1"/>
+          </p:cNvSpPr>
+          <p:nvPr>
+            <p:ph type="title"/>
+          </p:nvPr>
+        </p:nvSpPr>
+        <p:spPr/>
+        <p:txBody>
+          <a:bodyPr/>
+          <a:lstStyle/>
+          <a:p>
+            <a:r>
+              <a:rPr lang="en-US" dirty="0"/>
+              <a:t>String Interpolation</a:t>
+            </a:r>
+            <a:endParaRPr lang="bg-BG" dirty="0"/>
+          </a:p>
+        </p:txBody>
+      </p:sp>
+      <p:sp>
+        <p:nvSpPr>
+          <p:cNvPr id="3" name="Text Placeholder 2">
+            <a:extLst>
+              <a:ext uri="{FF2B5EF4-FFF2-40B4-BE49-F238E27FC236}">
+                <a16:creationId xmlns:a16="http://schemas.microsoft.com/office/drawing/2014/main" id="{79FD9404-2C36-4B17-A6AD-00D78B1B53DE}"/>
+              </a:ext>
+            </a:extLst>
+          </p:cNvPr>
+          <p:cNvSpPr>
+            <a:spLocks noGrp="1"/>
+          </p:cNvSpPr>
+          <p:nvPr>
+            <p:ph type="body" idx="1"/>
+          </p:nvPr>
+        </p:nvSpPr>
+        <p:spPr>
+          <a:xfrm>
+            <a:off x="1524000" y="3741906"/>
+            <a:ext cx="9144000" cy="2354093"/>
+          </a:xfrm>
+        </p:spPr>
+        <p:txBody>
+          <a:bodyPr/>
+          <a:lstStyle/>
+          <a:p>
+            <a:pPr marL="101600" indent="0">
+              <a:buNone/>
+            </a:pPr>
+            <a:r>
+              <a:rPr lang="en-US">
+                <a:hlinkClick r:id="rId2"/>
+              </a:rPr>
+              <a:t>More info: </a:t>
+            </a:r>
+          </a:p>
+          <a:p>
+            <a:pPr marL="101600" indent="0">
+              <a:buNone/>
+            </a:pPr>
+            <a:r>
+              <a:rPr lang="en-US" dirty="0">
+                <a:hlinkClick r:id="rId2"/>
+              </a:rPr>
+              <a:t>https://dzone.com/articles/c-string-format-examples#:~:text=String%20Formatting&amp;text=In%20C%23%2C%20the%20string%20Format,string%20representation%20of%20specified%20objects</a:t>
+            </a:r>
+            <a:r>
+              <a:rPr lang="en-US" dirty="0"/>
+              <a:t>. </a:t>
+            </a:r>
+            <a:endParaRPr lang="bg-BG" dirty="0"/>
+          </a:p>
+        </p:txBody>
+      </p:sp>
+      <p:pic>
+        <p:nvPicPr>
+          <p:cNvPr id="5" name="Picture 4">
+            <a:extLst>
+              <a:ext uri="{FF2B5EF4-FFF2-40B4-BE49-F238E27FC236}">
+                <a16:creationId xmlns:a16="http://schemas.microsoft.com/office/drawing/2014/main" id="{CE64E5F2-F600-4E28-881C-0302B1806CD4}"/>
+              </a:ext>
+            </a:extLst>
+          </p:cNvPr>
+          <p:cNvPicPr>
+            <a:picLocks noChangeAspect="1"/>
+          </p:cNvPicPr>
+          <p:nvPr/>
+        </p:nvPicPr>
+        <p:blipFill>
+          <a:blip r:embed="rId3"/>
+          <a:stretch>
+            <a:fillRect/>
+          </a:stretch>
+        </p:blipFill>
+        <p:spPr>
+          <a:xfrm>
+            <a:off x="1524000" y="1822113"/>
+            <a:ext cx="6096000" cy="1200150"/>
+          </a:xfrm>
+          <a:prstGeom prst="rect">
+            <a:avLst/>
+          </a:prstGeom>
+        </p:spPr>
+      </p:pic>
+    </p:spTree>
+    <p:extLst>
+      <p:ext uri="{BB962C8B-B14F-4D97-AF65-F5344CB8AC3E}">
+        <p14:creationId xmlns:p14="http://schemas.microsoft.com/office/powerpoint/2010/main" val="3987693182"/>
+      </p:ext>
+    </p:extLst>
+  </p:cSld>
+  <p:clrMapOvr>
+    <a:masterClrMapping/>
+  </p:clrMapOvr>
+</p:sld>
+</file>
+
+<file path=ppt/slides/slide5.xml><?xml version="1.0" encoding="utf-8"?>
+<p:sld xmlns:a="http://schemas.openxmlformats.org/drawingml/2006/main" xmlns:r="http://schemas.openxmlformats.org/officeDocument/2006/relationships" xmlns:p="http://schemas.openxmlformats.org/presentationml/2006/main">
+  <p:cSld>
+    <p:spTree>
+      <p:nvGrpSpPr>
+        <p:cNvPr id="1" name=""/>
+        <p:cNvGrpSpPr/>
+        <p:nvPr/>
+      </p:nvGrpSpPr>
+      <p:grpSpPr>
+        <a:xfrm>
+          <a:off x="0" y="0"/>
+          <a:ext cx="0" cy="0"/>
+          <a:chOff x="0" y="0"/>
+          <a:chExt cx="0" cy="0"/>
+        </a:xfrm>
+      </p:grpSpPr>
+      <p:sp>
+        <p:nvSpPr>
+          <p:cNvPr id="2" name="Title 1">
+            <a:extLst>
+              <a:ext uri="{FF2B5EF4-FFF2-40B4-BE49-F238E27FC236}">
+                <a16:creationId xmlns:a16="http://schemas.microsoft.com/office/drawing/2014/main" id="{E48E6B4F-C0A2-4822-89E1-46881400C000}"/>
+              </a:ext>
+            </a:extLst>
+          </p:cNvPr>
+          <p:cNvSpPr>
+            <a:spLocks noGrp="1"/>
+          </p:cNvSpPr>
+          <p:nvPr>
+            <p:ph type="title"/>
+          </p:nvPr>
+        </p:nvSpPr>
+        <p:spPr/>
+        <p:txBody>
+          <a:bodyPr/>
+          <a:lstStyle/>
+          <a:p>
+            <a:r>
+              <a:rPr lang="en-US" dirty="0"/>
+              <a:t>What is a string?</a:t>
+            </a:r>
+            <a:endParaRPr lang="bg-BG" dirty="0"/>
+          </a:p>
+        </p:txBody>
+      </p:sp>
+      <p:sp>
+        <p:nvSpPr>
+          <p:cNvPr id="3" name="Text Placeholder 2">
+            <a:extLst>
+              <a:ext uri="{FF2B5EF4-FFF2-40B4-BE49-F238E27FC236}">
+                <a16:creationId xmlns:a16="http://schemas.microsoft.com/office/drawing/2014/main" id="{1346F1C0-AD21-479C-993C-CC0429018AD6}"/>
+              </a:ext>
+            </a:extLst>
+          </p:cNvPr>
+          <p:cNvSpPr>
+            <a:spLocks noGrp="1"/>
+          </p:cNvSpPr>
+          <p:nvPr>
+            <p:ph type="body" idx="1"/>
+          </p:nvPr>
+        </p:nvSpPr>
+        <p:spPr/>
+        <p:txBody>
+          <a:bodyPr/>
+          <a:lstStyle/>
+          <a:p>
+            <a:r>
+              <a:rPr lang="en-US" dirty="0"/>
+              <a:t>A string is a sequence of characters stored in a certain address in memory.</a:t>
+            </a:r>
+          </a:p>
+          <a:p>
+            <a:r>
+              <a:rPr lang="en-US" dirty="0"/>
+              <a:t>Remember the type </a:t>
+            </a:r>
+            <a:r>
+              <a:rPr lang="en-US" b="1" u="sng" dirty="0"/>
+              <a:t>char</a:t>
+            </a:r>
+            <a:r>
+              <a:rPr lang="en-US" dirty="0"/>
+              <a:t>? </a:t>
+            </a:r>
+          </a:p>
+          <a:p>
+            <a:r>
+              <a:rPr lang="en-US" dirty="0"/>
+              <a:t>In the variable of type char we can record only one character. </a:t>
+            </a:r>
+          </a:p>
+          <a:p>
+            <a:r>
+              <a:rPr lang="en-US" dirty="0"/>
+              <a:t>Where it is necessary to process more than one character then strings come to our aid.</a:t>
+            </a:r>
+          </a:p>
+          <a:p>
+            <a:endParaRPr lang="bg-BG" dirty="0"/>
+          </a:p>
+        </p:txBody>
+      </p:sp>
+    </p:spTree>
+    <p:extLst>
+      <p:ext uri="{BB962C8B-B14F-4D97-AF65-F5344CB8AC3E}">
+        <p14:creationId xmlns:p14="http://schemas.microsoft.com/office/powerpoint/2010/main" val="16860538"/>
+      </p:ext>
+    </p:extLst>
+  </p:cSld>
+  <p:clrMapOvr>
+    <a:masterClrMapping/>
+  </p:clrMapOvr>
+</p:sld>
+</file>
+
+<file path=ppt/slides/slide50.xml><?xml version="1.0" encoding="utf-8"?>
+<p:sld xmlns:a="http://schemas.openxmlformats.org/drawingml/2006/main" xmlns:r="http://schemas.openxmlformats.org/officeDocument/2006/relationships" xmlns:p="http://schemas.openxmlformats.org/presentationml/2006/main">
+  <p:cSld>
+    <p:spTree>
+      <p:nvGrpSpPr>
+        <p:cNvPr id="1" name=""/>
+        <p:cNvGrpSpPr/>
+        <p:nvPr/>
+      </p:nvGrpSpPr>
+      <p:grpSpPr>
+        <a:xfrm>
+          <a:off x="0" y="0"/>
+          <a:ext cx="0" cy="0"/>
+          <a:chOff x="0" y="0"/>
+          <a:chExt cx="0" cy="0"/>
+        </a:xfrm>
+      </p:grpSpPr>
+      <p:sp>
+        <p:nvSpPr>
+          <p:cNvPr id="2" name="Title 1">
+            <a:extLst>
+              <a:ext uri="{FF2B5EF4-FFF2-40B4-BE49-F238E27FC236}">
+                <a16:creationId xmlns:a16="http://schemas.microsoft.com/office/drawing/2014/main" id="{FE6D1496-DBA1-4F1E-B31B-ECFD3A95AC9A}"/>
+              </a:ext>
+            </a:extLst>
+          </p:cNvPr>
+          <p:cNvSpPr>
+            <a:spLocks noGrp="1"/>
+          </p:cNvSpPr>
+          <p:nvPr>
+            <p:ph type="title"/>
+          </p:nvPr>
+        </p:nvSpPr>
+        <p:spPr/>
+        <p:txBody>
+          <a:bodyPr/>
+          <a:lstStyle/>
+          <a:p>
+            <a:r>
+              <a:rPr lang="en-US" dirty="0"/>
+              <a:t>Exercises</a:t>
+            </a:r>
+            <a:endParaRPr lang="bg-BG" dirty="0"/>
+          </a:p>
+        </p:txBody>
+      </p:sp>
+      <p:sp>
+        <p:nvSpPr>
+          <p:cNvPr id="3" name="Text Placeholder 2">
+            <a:extLst>
+              <a:ext uri="{FF2B5EF4-FFF2-40B4-BE49-F238E27FC236}">
+                <a16:creationId xmlns:a16="http://schemas.microsoft.com/office/drawing/2014/main" id="{46794E69-9CFC-447C-B558-E78A8A25E04F}"/>
+              </a:ext>
+            </a:extLst>
+          </p:cNvPr>
+          <p:cNvSpPr>
+            <a:spLocks noGrp="1"/>
+          </p:cNvSpPr>
+          <p:nvPr>
+            <p:ph type="body" idx="1"/>
+          </p:nvPr>
+        </p:nvSpPr>
+        <p:spPr>
+          <a:xfrm>
+            <a:off x="1523999" y="1600199"/>
+            <a:ext cx="10512357" cy="4936787"/>
+          </a:xfrm>
+        </p:spPr>
+        <p:txBody>
+          <a:bodyPr/>
+          <a:lstStyle/>
+          <a:p>
+            <a:pPr marL="558800" indent="-457200">
+              <a:buFont typeface="+mj-lt"/>
+              <a:buAutoNum type="arabicPeriod"/>
+            </a:pPr>
+            <a:r>
+              <a:rPr lang="en-US" sz="1800" dirty="0"/>
+              <a:t>Write a program that reads a string, reverse it and prints it to the console. For example: "introduction" =&gt; "</a:t>
+            </a:r>
+            <a:r>
+              <a:rPr lang="en-US" sz="1800" dirty="0" err="1"/>
+              <a:t>noitcudortni</a:t>
+            </a:r>
+            <a:r>
+              <a:rPr lang="en-US" sz="1800" dirty="0"/>
+              <a:t>".</a:t>
+            </a:r>
+          </a:p>
+          <a:p>
+            <a:pPr marL="558800" indent="-457200">
+              <a:buFont typeface="+mj-lt"/>
+              <a:buAutoNum type="arabicPeriod"/>
+            </a:pPr>
+            <a:r>
+              <a:rPr lang="en-US" sz="1800" dirty="0"/>
+              <a:t>Write a program that checks whether the parentheses are placed correctly in an arithmetic expression. </a:t>
+            </a:r>
+          </a:p>
+          <a:p>
+            <a:pPr lvl="1"/>
+            <a:r>
+              <a:rPr lang="en-US" sz="1600" dirty="0"/>
+              <a:t>Example of expression with correctly placed brackets: ((</a:t>
+            </a:r>
+            <a:r>
+              <a:rPr lang="en-US" sz="1600" dirty="0" err="1"/>
+              <a:t>a+b</a:t>
+            </a:r>
+            <a:r>
+              <a:rPr lang="en-US" sz="1600" dirty="0"/>
+              <a:t>)/5-d). </a:t>
+            </a:r>
+          </a:p>
+          <a:p>
+            <a:pPr lvl="1"/>
+            <a:r>
+              <a:rPr lang="en-US" sz="1600" dirty="0"/>
+              <a:t>Example of an incorrect expression: )(</a:t>
+            </a:r>
+            <a:r>
+              <a:rPr lang="en-US" sz="1600" dirty="0" err="1"/>
+              <a:t>a+b</a:t>
+            </a:r>
+            <a:r>
+              <a:rPr lang="en-US" sz="1600" dirty="0"/>
+              <a:t>))</a:t>
+            </a:r>
+          </a:p>
+          <a:p>
+            <a:pPr marL="558800" indent="-457200">
+              <a:buFont typeface="+mj-lt"/>
+              <a:buAutoNum type="arabicPeriod"/>
+            </a:pPr>
+            <a:r>
+              <a:rPr lang="en-US" sz="1800" dirty="0"/>
+              <a:t>Write a program that detects how many times a substring is contained in the text. </a:t>
+            </a:r>
+          </a:p>
+          <a:p>
+            <a:pPr marL="1016000" lvl="1" indent="-457200"/>
+            <a:r>
+              <a:rPr lang="en-US" sz="1600" dirty="0"/>
+              <a:t>For example, let’s look for the substring "in" in the text:</a:t>
+            </a:r>
+          </a:p>
+          <a:p>
+            <a:pPr marL="1016000" lvl="1" indent="-457200"/>
+            <a:r>
+              <a:rPr lang="en-US" sz="1600" i="1" dirty="0"/>
+              <a:t>We are living in a yellow submarine. We don't have anything else. Inside the submarine is very tight. So we are drinking all the day. We will move out of it in 5 days.</a:t>
+            </a:r>
+          </a:p>
+          <a:p>
+            <a:pPr lvl="3"/>
+            <a:r>
+              <a:rPr lang="en-US" sz="1200" dirty="0"/>
+              <a:t>The result is 9 occurrences.</a:t>
+            </a:r>
+            <a:endParaRPr lang="bg-BG" sz="1200" dirty="0"/>
+          </a:p>
+        </p:txBody>
+      </p:sp>
+    </p:spTree>
+    <p:extLst>
+      <p:ext uri="{BB962C8B-B14F-4D97-AF65-F5344CB8AC3E}">
+        <p14:creationId xmlns:p14="http://schemas.microsoft.com/office/powerpoint/2010/main" val="3146407016"/>
+      </p:ext>
+    </p:extLst>
+  </p:cSld>
+  <p:clrMapOvr>
+    <a:masterClrMapping/>
+  </p:clrMapOvr>
+</p:sld>
+</file>
+
+<file path=ppt/slides/slide51.xml><?xml version="1.0" encoding="utf-8"?>
+<p:sld xmlns:a="http://schemas.openxmlformats.org/drawingml/2006/main" xmlns:r="http://schemas.openxmlformats.org/officeDocument/2006/relationships" xmlns:p="http://schemas.openxmlformats.org/presentationml/2006/main">
+  <p:cSld>
+    <p:spTree>
+      <p:nvGrpSpPr>
+        <p:cNvPr id="1" name=""/>
+        <p:cNvGrpSpPr/>
+        <p:nvPr/>
+      </p:nvGrpSpPr>
+      <p:grpSpPr>
+        <a:xfrm>
+          <a:off x="0" y="0"/>
+          <a:ext cx="0" cy="0"/>
+          <a:chOff x="0" y="0"/>
+          <a:chExt cx="0" cy="0"/>
+        </a:xfrm>
+      </p:grpSpPr>
+      <p:sp>
+        <p:nvSpPr>
+          <p:cNvPr id="2" name="Title 1">
+            <a:extLst>
+              <a:ext uri="{FF2B5EF4-FFF2-40B4-BE49-F238E27FC236}">
+                <a16:creationId xmlns:a16="http://schemas.microsoft.com/office/drawing/2014/main" id="{1A05734E-AECF-42D6-856A-DB255C8EACC9}"/>
+              </a:ext>
+            </a:extLst>
+          </p:cNvPr>
+          <p:cNvSpPr>
+            <a:spLocks noGrp="1"/>
+          </p:cNvSpPr>
+          <p:nvPr>
+            <p:ph type="title"/>
+          </p:nvPr>
+        </p:nvSpPr>
+        <p:spPr/>
+        <p:txBody>
+          <a:bodyPr/>
+          <a:lstStyle/>
+          <a:p>
+            <a:r>
+              <a:rPr lang="en-US" dirty="0"/>
+              <a:t>Exercises</a:t>
+            </a:r>
+            <a:endParaRPr lang="bg-BG" dirty="0"/>
+          </a:p>
+        </p:txBody>
+      </p:sp>
+      <p:sp>
+        <p:nvSpPr>
+          <p:cNvPr id="3" name="Text Placeholder 2">
+            <a:extLst>
+              <a:ext uri="{FF2B5EF4-FFF2-40B4-BE49-F238E27FC236}">
+                <a16:creationId xmlns:a16="http://schemas.microsoft.com/office/drawing/2014/main" id="{EFCBA505-9A60-4594-BC4C-7B981DDE63B6}"/>
+              </a:ext>
+            </a:extLst>
+          </p:cNvPr>
+          <p:cNvSpPr>
+            <a:spLocks noGrp="1"/>
+          </p:cNvSpPr>
+          <p:nvPr>
+            <p:ph type="body" idx="1"/>
+          </p:nvPr>
+        </p:nvSpPr>
+        <p:spPr/>
+        <p:txBody>
+          <a:bodyPr/>
+          <a:lstStyle/>
+          <a:p>
+            <a:pPr marL="101600" indent="0">
+              <a:buNone/>
+            </a:pPr>
+            <a:r>
+              <a:rPr lang="en-US" sz="1800" dirty="0"/>
+              <a:t>4. Write a program that extracts from a text all sentences that contain a particular word. We accept that the sentences are separated from each other by the character "." and the words are separated from one another by a character which is not a letter. </a:t>
+            </a:r>
+          </a:p>
+          <a:p>
+            <a:pPr lvl="1"/>
+            <a:r>
+              <a:rPr lang="en-US" sz="1600" dirty="0"/>
+              <a:t>Sample text: </a:t>
+            </a:r>
+          </a:p>
+          <a:p>
+            <a:pPr lvl="2"/>
+            <a:r>
+              <a:rPr lang="en-US" sz="1400" dirty="0"/>
+              <a:t>We are living in a yellow submarine. We don't have anything else. Inside the submarine is very tight. So we are drinking all the day. We will move out of it in 5 days.</a:t>
+            </a:r>
+          </a:p>
+          <a:p>
+            <a:pPr lvl="1"/>
+            <a:r>
+              <a:rPr lang="en-US" sz="1600" dirty="0"/>
+              <a:t>Sample result:</a:t>
+            </a:r>
+          </a:p>
+          <a:p>
+            <a:pPr lvl="2"/>
+            <a:r>
+              <a:rPr lang="en-US" sz="1400" dirty="0"/>
+              <a:t>We are living in a yellow submarine.</a:t>
+            </a:r>
+          </a:p>
+          <a:p>
+            <a:pPr lvl="2"/>
+            <a:r>
+              <a:rPr lang="en-US" sz="1400" dirty="0"/>
+              <a:t>We will move out of it in 5 days.</a:t>
+            </a:r>
+            <a:endParaRPr lang="bg-BG" sz="1400" dirty="0"/>
+          </a:p>
+        </p:txBody>
+      </p:sp>
+    </p:spTree>
+    <p:extLst>
+      <p:ext uri="{BB962C8B-B14F-4D97-AF65-F5344CB8AC3E}">
+        <p14:creationId xmlns:p14="http://schemas.microsoft.com/office/powerpoint/2010/main" val="3872015676"/>
+      </p:ext>
+    </p:extLst>
+  </p:cSld>
+  <p:clrMapOvr>
+    <a:masterClrMapping/>
+  </p:clrMapOvr>
+</p:sld>
+</file>
+
+<file path=ppt/slides/slide52.xml><?xml version="1.0" encoding="utf-8"?>
 <p:sld xmlns:a="http://schemas.openxmlformats.org/drawingml/2006/main" xmlns:r="http://schemas.openxmlformats.org/officeDocument/2006/relationships" xmlns:p="http://schemas.openxmlformats.org/presentationml/2006/main">
   <p:cSld>
     <p:spTree>
@@ -14159,7 +17425,7 @@
 </p:sld>
 </file>
 
-<file path=ppt/slides/slide31.xml><?xml version="1.0" encoding="utf-8"?>
+<file path=ppt/slides/slide53.xml><?xml version="1.0" encoding="utf-8"?>
 <p:sld xmlns:a="http://schemas.openxmlformats.org/drawingml/2006/main" xmlns:r="http://schemas.openxmlformats.org/officeDocument/2006/relationships" xmlns:p="http://schemas.openxmlformats.org/presentationml/2006/main">
   <p:cSld>
     <p:spTree>
@@ -14280,7 +17546,7 @@
 </p:sld>
 </file>
 
-<file path=ppt/slides/slide32.xml><?xml version="1.0" encoding="utf-8"?>
+<file path=ppt/slides/slide54.xml><?xml version="1.0" encoding="utf-8"?>
 <p:sld xmlns:a="http://schemas.openxmlformats.org/drawingml/2006/main" xmlns:r="http://schemas.openxmlformats.org/officeDocument/2006/relationships" xmlns:p="http://schemas.openxmlformats.org/presentationml/2006/main">
   <p:cSld>
     <p:spTree>
@@ -14426,7 +17692,7 @@
 </p:sld>
 </file>
 
-<file path=ppt/slides/slide33.xml><?xml version="1.0" encoding="utf-8"?>
+<file path=ppt/slides/slide55.xml><?xml version="1.0" encoding="utf-8"?>
 <p:sld xmlns:a="http://schemas.openxmlformats.org/drawingml/2006/main" xmlns:r="http://schemas.openxmlformats.org/officeDocument/2006/relationships" xmlns:p="http://schemas.openxmlformats.org/presentationml/2006/main">
   <p:cSld>
     <p:spTree>
@@ -14572,224 +17838,6 @@
         </p:txBody>
       </p:sp>
     </p:spTree>
-  </p:cSld>
-  <p:clrMapOvr>
-    <a:masterClrMapping/>
-  </p:clrMapOvr>
-</p:sld>
-</file>
-
-<file path=ppt/slides/slide4.xml><?xml version="1.0" encoding="utf-8"?>
-<p:sld xmlns:a="http://schemas.openxmlformats.org/drawingml/2006/main" xmlns:r="http://schemas.openxmlformats.org/officeDocument/2006/relationships" xmlns:p="http://schemas.openxmlformats.org/presentationml/2006/main">
-  <p:cSld>
-    <p:spTree>
-      <p:nvGrpSpPr>
-        <p:cNvPr id="1" name=""/>
-        <p:cNvGrpSpPr/>
-        <p:nvPr/>
-      </p:nvGrpSpPr>
-      <p:grpSpPr>
-        <a:xfrm>
-          <a:off x="0" y="0"/>
-          <a:ext cx="0" cy="0"/>
-          <a:chOff x="0" y="0"/>
-          <a:chExt cx="0" cy="0"/>
-        </a:xfrm>
-      </p:grpSpPr>
-      <p:sp>
-        <p:nvSpPr>
-          <p:cNvPr id="2" name="Title 1">
-            <a:extLst>
-              <a:ext uri="{FF2B5EF4-FFF2-40B4-BE49-F238E27FC236}">
-                <a16:creationId xmlns:a16="http://schemas.microsoft.com/office/drawing/2014/main" id="{DC86D56C-8239-4E58-AA9B-C1F99F8E7D2F}"/>
-              </a:ext>
-            </a:extLst>
-          </p:cNvPr>
-          <p:cNvSpPr>
-            <a:spLocks noGrp="1"/>
-          </p:cNvSpPr>
-          <p:nvPr>
-            <p:ph type="title"/>
-          </p:nvPr>
-        </p:nvSpPr>
-        <p:spPr/>
-        <p:txBody>
-          <a:bodyPr/>
-          <a:lstStyle/>
-          <a:p>
-            <a:r>
-              <a:rPr lang="en-US" dirty="0"/>
-              <a:t>Strings</a:t>
-            </a:r>
-            <a:endParaRPr lang="bg-BG" dirty="0"/>
-          </a:p>
-        </p:txBody>
-      </p:sp>
-      <p:sp>
-        <p:nvSpPr>
-          <p:cNvPr id="3" name="Text Placeholder 2">
-            <a:extLst>
-              <a:ext uri="{FF2B5EF4-FFF2-40B4-BE49-F238E27FC236}">
-                <a16:creationId xmlns:a16="http://schemas.microsoft.com/office/drawing/2014/main" id="{125C1829-07AE-47D2-9119-AE2991300683}"/>
-              </a:ext>
-            </a:extLst>
-          </p:cNvPr>
-          <p:cNvSpPr>
-            <a:spLocks noGrp="1"/>
-          </p:cNvSpPr>
-          <p:nvPr>
-            <p:ph type="body" idx="1"/>
-          </p:nvPr>
-        </p:nvSpPr>
-        <p:spPr/>
-        <p:txBody>
-          <a:bodyPr/>
-          <a:lstStyle/>
-          <a:p>
-            <a:r>
-              <a:rPr lang="en-US" dirty="0"/>
-              <a:t>In practice we often come to the text processing: reading text files, searching for keywords and replacing them in a paragraph, validating user input data, </a:t>
-            </a:r>
-            <a:r>
-              <a:rPr lang="en-US" dirty="0" err="1"/>
-              <a:t>etc</a:t>
-            </a:r>
-            <a:r>
-              <a:rPr lang="en-US" dirty="0"/>
-              <a:t>… </a:t>
-            </a:r>
-          </a:p>
-          <a:p>
-            <a:r>
-              <a:rPr lang="en-US" dirty="0"/>
-              <a:t>In such cases we can save the text content, which we will need in strings, and process them using the C# language.</a:t>
-            </a:r>
-            <a:endParaRPr lang="bg-BG" dirty="0"/>
-          </a:p>
-        </p:txBody>
-      </p:sp>
-    </p:spTree>
-    <p:extLst>
-      <p:ext uri="{BB962C8B-B14F-4D97-AF65-F5344CB8AC3E}">
-        <p14:creationId xmlns:p14="http://schemas.microsoft.com/office/powerpoint/2010/main" val="2644478045"/>
-      </p:ext>
-    </p:extLst>
-  </p:cSld>
-  <p:clrMapOvr>
-    <a:masterClrMapping/>
-  </p:clrMapOvr>
-</p:sld>
-</file>
-
-<file path=ppt/slides/slide5.xml><?xml version="1.0" encoding="utf-8"?>
-<p:sld xmlns:a="http://schemas.openxmlformats.org/drawingml/2006/main" xmlns:r="http://schemas.openxmlformats.org/officeDocument/2006/relationships" xmlns:p="http://schemas.openxmlformats.org/presentationml/2006/main">
-  <p:cSld>
-    <p:spTree>
-      <p:nvGrpSpPr>
-        <p:cNvPr id="1" name=""/>
-        <p:cNvGrpSpPr/>
-        <p:nvPr/>
-      </p:nvGrpSpPr>
-      <p:grpSpPr>
-        <a:xfrm>
-          <a:off x="0" y="0"/>
-          <a:ext cx="0" cy="0"/>
-          <a:chOff x="0" y="0"/>
-          <a:chExt cx="0" cy="0"/>
-        </a:xfrm>
-      </p:grpSpPr>
-      <p:sp>
-        <p:nvSpPr>
-          <p:cNvPr id="2" name="Title 1">
-            <a:extLst>
-              <a:ext uri="{FF2B5EF4-FFF2-40B4-BE49-F238E27FC236}">
-                <a16:creationId xmlns:a16="http://schemas.microsoft.com/office/drawing/2014/main" id="{E48E6B4F-C0A2-4822-89E1-46881400C000}"/>
-              </a:ext>
-            </a:extLst>
-          </p:cNvPr>
-          <p:cNvSpPr>
-            <a:spLocks noGrp="1"/>
-          </p:cNvSpPr>
-          <p:nvPr>
-            <p:ph type="title"/>
-          </p:nvPr>
-        </p:nvSpPr>
-        <p:spPr/>
-        <p:txBody>
-          <a:bodyPr/>
-          <a:lstStyle/>
-          <a:p>
-            <a:r>
-              <a:rPr lang="en-US" dirty="0"/>
-              <a:t>What is a string?</a:t>
-            </a:r>
-            <a:endParaRPr lang="bg-BG" dirty="0"/>
-          </a:p>
-        </p:txBody>
-      </p:sp>
-      <p:sp>
-        <p:nvSpPr>
-          <p:cNvPr id="3" name="Text Placeholder 2">
-            <a:extLst>
-              <a:ext uri="{FF2B5EF4-FFF2-40B4-BE49-F238E27FC236}">
-                <a16:creationId xmlns:a16="http://schemas.microsoft.com/office/drawing/2014/main" id="{1346F1C0-AD21-479C-993C-CC0429018AD6}"/>
-              </a:ext>
-            </a:extLst>
-          </p:cNvPr>
-          <p:cNvSpPr>
-            <a:spLocks noGrp="1"/>
-          </p:cNvSpPr>
-          <p:nvPr>
-            <p:ph type="body" idx="1"/>
-          </p:nvPr>
-        </p:nvSpPr>
-        <p:spPr/>
-        <p:txBody>
-          <a:bodyPr/>
-          <a:lstStyle/>
-          <a:p>
-            <a:r>
-              <a:rPr lang="en-US" dirty="0"/>
-              <a:t>A string is a sequence of characters stored in a certain address in memory.</a:t>
-            </a:r>
-          </a:p>
-          <a:p>
-            <a:r>
-              <a:rPr lang="en-US" dirty="0"/>
-              <a:t>Remember the type </a:t>
-            </a:r>
-            <a:r>
-              <a:rPr lang="en-US" b="1" u="sng" dirty="0"/>
-              <a:t>char</a:t>
-            </a:r>
-            <a:r>
-              <a:rPr lang="en-US" dirty="0"/>
-              <a:t>? </a:t>
-            </a:r>
-          </a:p>
-          <a:p>
-            <a:r>
-              <a:rPr lang="en-US" dirty="0"/>
-              <a:t>In the variable of type char we can record only one character. </a:t>
-            </a:r>
-          </a:p>
-          <a:p>
-            <a:r>
-              <a:rPr lang="en-US" dirty="0"/>
-              <a:t>Where it is necessary to process more than one character then strings come to our aid.</a:t>
-            </a:r>
-          </a:p>
-          <a:p>
-            <a:endParaRPr lang="bg-BG" dirty="0"/>
-          </a:p>
-        </p:txBody>
-      </p:sp>
-    </p:spTree>
-    <p:extLst>
-      <p:ext uri="{BB962C8B-B14F-4D97-AF65-F5344CB8AC3E}">
-        <p14:creationId xmlns:p14="http://schemas.microsoft.com/office/powerpoint/2010/main" val="16860538"/>
-      </p:ext>
-    </p:extLst>
   </p:cSld>
   <p:clrMapOvr>
     <a:masterClrMapping/>

</xml_diff>